<commit_message>
zeug zeug zeug zeug zeug
</commit_message>
<xml_diff>
--- a/Manual/Supply Chain Manager.pptx
+++ b/Manual/Supply Chain Manager.pptx
@@ -5,18 +5,26 @@
     <p:sldMasterId id="2147483672" r:id="rId1"/>
   </p:sldMasterIdLst>
   <p:notesMasterIdLst>
-    <p:notesMasterId r:id="rId11"/>
+    <p:notesMasterId r:id="rId19"/>
   </p:notesMasterIdLst>
   <p:sldIdLst>
     <p:sldId id="256" r:id="rId2"/>
     <p:sldId id="257" r:id="rId3"/>
-    <p:sldId id="258" r:id="rId4"/>
-    <p:sldId id="259" r:id="rId5"/>
-    <p:sldId id="261" r:id="rId6"/>
-    <p:sldId id="260" r:id="rId7"/>
-    <p:sldId id="262" r:id="rId8"/>
-    <p:sldId id="263" r:id="rId9"/>
-    <p:sldId id="264" r:id="rId10"/>
+    <p:sldId id="274" r:id="rId4"/>
+    <p:sldId id="275" r:id="rId5"/>
+    <p:sldId id="273" r:id="rId6"/>
+    <p:sldId id="267" r:id="rId7"/>
+    <p:sldId id="269" r:id="rId8"/>
+    <p:sldId id="268" r:id="rId9"/>
+    <p:sldId id="265" r:id="rId10"/>
+    <p:sldId id="272" r:id="rId11"/>
+    <p:sldId id="270" r:id="rId12"/>
+    <p:sldId id="259" r:id="rId13"/>
+    <p:sldId id="261" r:id="rId14"/>
+    <p:sldId id="260" r:id="rId15"/>
+    <p:sldId id="262" r:id="rId16"/>
+    <p:sldId id="263" r:id="rId17"/>
+    <p:sldId id="264" r:id="rId18"/>
   </p:sldIdLst>
   <p:sldSz cx="9144000" cy="6858000" type="screen4x3"/>
   <p:notesSz cx="6858000" cy="9144000"/>
@@ -118,6 +126,2353 @@
 </p:presentation>
 </file>
 
+<file path=ppt/diagrams/colors1.xml><?xml version="1.0" encoding="utf-8"?>
+<dgm:colorsDef xmlns:dgm="http://schemas.openxmlformats.org/drawingml/2006/diagram" xmlns:a="http://schemas.openxmlformats.org/drawingml/2006/main" uniqueId="urn:microsoft.com/office/officeart/2005/8/colors/accent1_2">
+  <dgm:title val=""/>
+  <dgm:desc val=""/>
+  <dgm:catLst>
+    <dgm:cat type="accent1" pri="11200"/>
+  </dgm:catLst>
+  <dgm:styleLbl name="node0">
+    <dgm:fillClrLst meth="repeat">
+      <a:schemeClr val="accent1"/>
+    </dgm:fillClrLst>
+    <dgm:linClrLst meth="repeat">
+      <a:schemeClr val="lt1"/>
+    </dgm:linClrLst>
+    <dgm:effectClrLst/>
+    <dgm:txLinClrLst/>
+    <dgm:txFillClrLst/>
+    <dgm:txEffectClrLst/>
+  </dgm:styleLbl>
+  <dgm:styleLbl name="alignNode1">
+    <dgm:fillClrLst meth="repeat">
+      <a:schemeClr val="accent1"/>
+    </dgm:fillClrLst>
+    <dgm:linClrLst meth="repeat">
+      <a:schemeClr val="accent1"/>
+    </dgm:linClrLst>
+    <dgm:effectClrLst/>
+    <dgm:txLinClrLst/>
+    <dgm:txFillClrLst/>
+    <dgm:txEffectClrLst/>
+  </dgm:styleLbl>
+  <dgm:styleLbl name="node1">
+    <dgm:fillClrLst meth="repeat">
+      <a:schemeClr val="accent1"/>
+    </dgm:fillClrLst>
+    <dgm:linClrLst meth="repeat">
+      <a:schemeClr val="lt1"/>
+    </dgm:linClrLst>
+    <dgm:effectClrLst/>
+    <dgm:txLinClrLst/>
+    <dgm:txFillClrLst/>
+    <dgm:txEffectClrLst/>
+  </dgm:styleLbl>
+  <dgm:styleLbl name="lnNode1">
+    <dgm:fillClrLst meth="repeat">
+      <a:schemeClr val="accent1"/>
+    </dgm:fillClrLst>
+    <dgm:linClrLst meth="repeat">
+      <a:schemeClr val="lt1"/>
+    </dgm:linClrLst>
+    <dgm:effectClrLst/>
+    <dgm:txLinClrLst/>
+    <dgm:txFillClrLst/>
+    <dgm:txEffectClrLst/>
+  </dgm:styleLbl>
+  <dgm:styleLbl name="vennNode1">
+    <dgm:fillClrLst meth="repeat">
+      <a:schemeClr val="accent1">
+        <a:alpha val="50000"/>
+      </a:schemeClr>
+    </dgm:fillClrLst>
+    <dgm:linClrLst meth="repeat">
+      <a:schemeClr val="lt1"/>
+    </dgm:linClrLst>
+    <dgm:effectClrLst/>
+    <dgm:txLinClrLst/>
+    <dgm:txFillClrLst/>
+    <dgm:txEffectClrLst/>
+  </dgm:styleLbl>
+  <dgm:styleLbl name="node2">
+    <dgm:fillClrLst meth="repeat">
+      <a:schemeClr val="accent1"/>
+    </dgm:fillClrLst>
+    <dgm:linClrLst meth="repeat">
+      <a:schemeClr val="lt1"/>
+    </dgm:linClrLst>
+    <dgm:effectClrLst/>
+    <dgm:txLinClrLst/>
+    <dgm:txFillClrLst/>
+    <dgm:txEffectClrLst/>
+  </dgm:styleLbl>
+  <dgm:styleLbl name="node3">
+    <dgm:fillClrLst meth="repeat">
+      <a:schemeClr val="accent1"/>
+    </dgm:fillClrLst>
+    <dgm:linClrLst meth="repeat">
+      <a:schemeClr val="lt1"/>
+    </dgm:linClrLst>
+    <dgm:effectClrLst/>
+    <dgm:txLinClrLst/>
+    <dgm:txFillClrLst/>
+    <dgm:txEffectClrLst/>
+  </dgm:styleLbl>
+  <dgm:styleLbl name="node4">
+    <dgm:fillClrLst meth="repeat">
+      <a:schemeClr val="accent1"/>
+    </dgm:fillClrLst>
+    <dgm:linClrLst meth="repeat">
+      <a:schemeClr val="lt1"/>
+    </dgm:linClrLst>
+    <dgm:effectClrLst/>
+    <dgm:txLinClrLst/>
+    <dgm:txFillClrLst/>
+    <dgm:txEffectClrLst/>
+  </dgm:styleLbl>
+  <dgm:styleLbl name="fgImgPlace1">
+    <dgm:fillClrLst meth="repeat">
+      <a:schemeClr val="accent1">
+        <a:tint val="50000"/>
+      </a:schemeClr>
+    </dgm:fillClrLst>
+    <dgm:linClrLst meth="repeat">
+      <a:schemeClr val="lt1"/>
+    </dgm:linClrLst>
+    <dgm:effectClrLst/>
+    <dgm:txLinClrLst/>
+    <dgm:txFillClrLst meth="repeat">
+      <a:schemeClr val="lt1"/>
+    </dgm:txFillClrLst>
+    <dgm:txEffectClrLst/>
+  </dgm:styleLbl>
+  <dgm:styleLbl name="alignImgPlace1">
+    <dgm:fillClrLst meth="repeat">
+      <a:schemeClr val="accent1">
+        <a:tint val="50000"/>
+      </a:schemeClr>
+    </dgm:fillClrLst>
+    <dgm:linClrLst meth="repeat">
+      <a:schemeClr val="lt1"/>
+    </dgm:linClrLst>
+    <dgm:effectClrLst/>
+    <dgm:txLinClrLst/>
+    <dgm:txFillClrLst meth="repeat">
+      <a:schemeClr val="lt1"/>
+    </dgm:txFillClrLst>
+    <dgm:txEffectClrLst/>
+  </dgm:styleLbl>
+  <dgm:styleLbl name="bgImgPlace1">
+    <dgm:fillClrLst meth="repeat">
+      <a:schemeClr val="accent1">
+        <a:tint val="50000"/>
+      </a:schemeClr>
+    </dgm:fillClrLst>
+    <dgm:linClrLst meth="repeat">
+      <a:schemeClr val="lt1"/>
+    </dgm:linClrLst>
+    <dgm:effectClrLst/>
+    <dgm:txLinClrLst/>
+    <dgm:txFillClrLst meth="repeat">
+      <a:schemeClr val="lt1"/>
+    </dgm:txFillClrLst>
+    <dgm:txEffectClrLst/>
+  </dgm:styleLbl>
+  <dgm:styleLbl name="sibTrans2D1">
+    <dgm:fillClrLst meth="repeat">
+      <a:schemeClr val="accent1">
+        <a:tint val="60000"/>
+      </a:schemeClr>
+    </dgm:fillClrLst>
+    <dgm:linClrLst meth="repeat">
+      <a:schemeClr val="accent1">
+        <a:tint val="60000"/>
+      </a:schemeClr>
+    </dgm:linClrLst>
+    <dgm:effectClrLst/>
+    <dgm:txLinClrLst/>
+    <dgm:txFillClrLst/>
+    <dgm:txEffectClrLst/>
+  </dgm:styleLbl>
+  <dgm:styleLbl name="fgSibTrans2D1">
+    <dgm:fillClrLst meth="repeat">
+      <a:schemeClr val="accent1">
+        <a:tint val="60000"/>
+      </a:schemeClr>
+    </dgm:fillClrLst>
+    <dgm:linClrLst meth="repeat">
+      <a:schemeClr val="accent1">
+        <a:tint val="60000"/>
+      </a:schemeClr>
+    </dgm:linClrLst>
+    <dgm:effectClrLst/>
+    <dgm:txLinClrLst/>
+    <dgm:txFillClrLst/>
+    <dgm:txEffectClrLst/>
+  </dgm:styleLbl>
+  <dgm:styleLbl name="bgSibTrans2D1">
+    <dgm:fillClrLst meth="repeat">
+      <a:schemeClr val="accent1">
+        <a:tint val="60000"/>
+      </a:schemeClr>
+    </dgm:fillClrLst>
+    <dgm:linClrLst meth="repeat">
+      <a:schemeClr val="accent1">
+        <a:tint val="60000"/>
+      </a:schemeClr>
+    </dgm:linClrLst>
+    <dgm:effectClrLst/>
+    <dgm:txLinClrLst/>
+    <dgm:txFillClrLst/>
+    <dgm:txEffectClrLst/>
+  </dgm:styleLbl>
+  <dgm:styleLbl name="sibTrans1D1">
+    <dgm:fillClrLst meth="repeat">
+      <a:schemeClr val="accent1"/>
+    </dgm:fillClrLst>
+    <dgm:linClrLst meth="repeat">
+      <a:schemeClr val="accent1"/>
+    </dgm:linClrLst>
+    <dgm:effectClrLst/>
+    <dgm:txLinClrLst/>
+    <dgm:txFillClrLst meth="repeat">
+      <a:schemeClr val="tx1"/>
+    </dgm:txFillClrLst>
+    <dgm:txEffectClrLst/>
+  </dgm:styleLbl>
+  <dgm:styleLbl name="callout">
+    <dgm:fillClrLst meth="repeat">
+      <a:schemeClr val="accent1"/>
+    </dgm:fillClrLst>
+    <dgm:linClrLst meth="repeat">
+      <a:schemeClr val="accent1">
+        <a:tint val="50000"/>
+      </a:schemeClr>
+    </dgm:linClrLst>
+    <dgm:effectClrLst/>
+    <dgm:txLinClrLst/>
+    <dgm:txFillClrLst meth="repeat">
+      <a:schemeClr val="tx1"/>
+    </dgm:txFillClrLst>
+    <dgm:txEffectClrLst/>
+  </dgm:styleLbl>
+  <dgm:styleLbl name="asst0">
+    <dgm:fillClrLst meth="repeat">
+      <a:schemeClr val="accent1"/>
+    </dgm:fillClrLst>
+    <dgm:linClrLst meth="repeat">
+      <a:schemeClr val="lt1"/>
+    </dgm:linClrLst>
+    <dgm:effectClrLst/>
+    <dgm:txLinClrLst/>
+    <dgm:txFillClrLst/>
+    <dgm:txEffectClrLst/>
+  </dgm:styleLbl>
+  <dgm:styleLbl name="asst1">
+    <dgm:fillClrLst meth="repeat">
+      <a:schemeClr val="accent1"/>
+    </dgm:fillClrLst>
+    <dgm:linClrLst meth="repeat">
+      <a:schemeClr val="lt1"/>
+    </dgm:linClrLst>
+    <dgm:effectClrLst/>
+    <dgm:txLinClrLst/>
+    <dgm:txFillClrLst/>
+    <dgm:txEffectClrLst/>
+  </dgm:styleLbl>
+  <dgm:styleLbl name="asst2">
+    <dgm:fillClrLst meth="repeat">
+      <a:schemeClr val="accent1"/>
+    </dgm:fillClrLst>
+    <dgm:linClrLst meth="repeat">
+      <a:schemeClr val="lt1"/>
+    </dgm:linClrLst>
+    <dgm:effectClrLst/>
+    <dgm:txLinClrLst/>
+    <dgm:txFillClrLst/>
+    <dgm:txEffectClrLst/>
+  </dgm:styleLbl>
+  <dgm:styleLbl name="asst3">
+    <dgm:fillClrLst meth="repeat">
+      <a:schemeClr val="accent1"/>
+    </dgm:fillClrLst>
+    <dgm:linClrLst meth="repeat">
+      <a:schemeClr val="lt1"/>
+    </dgm:linClrLst>
+    <dgm:effectClrLst/>
+    <dgm:txLinClrLst/>
+    <dgm:txFillClrLst/>
+    <dgm:txEffectClrLst/>
+  </dgm:styleLbl>
+  <dgm:styleLbl name="asst4">
+    <dgm:fillClrLst meth="repeat">
+      <a:schemeClr val="accent1"/>
+    </dgm:fillClrLst>
+    <dgm:linClrLst meth="repeat">
+      <a:schemeClr val="lt1"/>
+    </dgm:linClrLst>
+    <dgm:effectClrLst/>
+    <dgm:txLinClrLst/>
+    <dgm:txFillClrLst/>
+    <dgm:txEffectClrLst/>
+  </dgm:styleLbl>
+  <dgm:styleLbl name="parChTrans2D1">
+    <dgm:fillClrLst meth="repeat">
+      <a:schemeClr val="accent1">
+        <a:tint val="60000"/>
+      </a:schemeClr>
+    </dgm:fillClrLst>
+    <dgm:linClrLst meth="repeat">
+      <a:schemeClr val="accent1">
+        <a:tint val="60000"/>
+      </a:schemeClr>
+    </dgm:linClrLst>
+    <dgm:effectClrLst/>
+    <dgm:txLinClrLst/>
+    <dgm:txFillClrLst meth="repeat">
+      <a:schemeClr val="lt1"/>
+    </dgm:txFillClrLst>
+    <dgm:txEffectClrLst/>
+  </dgm:styleLbl>
+  <dgm:styleLbl name="parChTrans2D2">
+    <dgm:fillClrLst meth="repeat">
+      <a:schemeClr val="accent1"/>
+    </dgm:fillClrLst>
+    <dgm:linClrLst meth="repeat">
+      <a:schemeClr val="accent1"/>
+    </dgm:linClrLst>
+    <dgm:effectClrLst/>
+    <dgm:txLinClrLst/>
+    <dgm:txFillClrLst meth="repeat">
+      <a:schemeClr val="lt1"/>
+    </dgm:txFillClrLst>
+    <dgm:txEffectClrLst/>
+  </dgm:styleLbl>
+  <dgm:styleLbl name="parChTrans2D3">
+    <dgm:fillClrLst meth="repeat">
+      <a:schemeClr val="accent1"/>
+    </dgm:fillClrLst>
+    <dgm:linClrLst meth="repeat">
+      <a:schemeClr val="accent1"/>
+    </dgm:linClrLst>
+    <dgm:effectClrLst/>
+    <dgm:txLinClrLst/>
+    <dgm:txFillClrLst meth="repeat">
+      <a:schemeClr val="lt1"/>
+    </dgm:txFillClrLst>
+    <dgm:txEffectClrLst/>
+  </dgm:styleLbl>
+  <dgm:styleLbl name="parChTrans2D4">
+    <dgm:fillClrLst meth="repeat">
+      <a:schemeClr val="accent1"/>
+    </dgm:fillClrLst>
+    <dgm:linClrLst meth="repeat">
+      <a:schemeClr val="accent1"/>
+    </dgm:linClrLst>
+    <dgm:effectClrLst/>
+    <dgm:txLinClrLst/>
+    <dgm:txFillClrLst meth="repeat">
+      <a:schemeClr val="lt1"/>
+    </dgm:txFillClrLst>
+    <dgm:txEffectClrLst/>
+  </dgm:styleLbl>
+  <dgm:styleLbl name="parChTrans1D1">
+    <dgm:fillClrLst meth="repeat">
+      <a:schemeClr val="accent1"/>
+    </dgm:fillClrLst>
+    <dgm:linClrLst meth="repeat">
+      <a:schemeClr val="accent1">
+        <a:shade val="60000"/>
+      </a:schemeClr>
+    </dgm:linClrLst>
+    <dgm:effectClrLst/>
+    <dgm:txLinClrLst/>
+    <dgm:txFillClrLst meth="repeat">
+      <a:schemeClr val="tx1"/>
+    </dgm:txFillClrLst>
+    <dgm:txEffectClrLst/>
+  </dgm:styleLbl>
+  <dgm:styleLbl name="parChTrans1D2">
+    <dgm:fillClrLst meth="repeat">
+      <a:schemeClr val="accent1"/>
+    </dgm:fillClrLst>
+    <dgm:linClrLst meth="repeat">
+      <a:schemeClr val="accent1">
+        <a:shade val="60000"/>
+      </a:schemeClr>
+    </dgm:linClrLst>
+    <dgm:effectClrLst/>
+    <dgm:txLinClrLst/>
+    <dgm:txFillClrLst meth="repeat">
+      <a:schemeClr val="tx1"/>
+    </dgm:txFillClrLst>
+    <dgm:txEffectClrLst/>
+  </dgm:styleLbl>
+  <dgm:styleLbl name="parChTrans1D3">
+    <dgm:fillClrLst meth="repeat">
+      <a:schemeClr val="accent1"/>
+    </dgm:fillClrLst>
+    <dgm:linClrLst meth="repeat">
+      <a:schemeClr val="accent1">
+        <a:shade val="80000"/>
+      </a:schemeClr>
+    </dgm:linClrLst>
+    <dgm:effectClrLst/>
+    <dgm:txLinClrLst/>
+    <dgm:txFillClrLst meth="repeat">
+      <a:schemeClr val="tx1"/>
+    </dgm:txFillClrLst>
+    <dgm:txEffectClrLst/>
+  </dgm:styleLbl>
+  <dgm:styleLbl name="parChTrans1D4">
+    <dgm:fillClrLst meth="repeat">
+      <a:schemeClr val="accent1"/>
+    </dgm:fillClrLst>
+    <dgm:linClrLst meth="repeat">
+      <a:schemeClr val="accent1">
+        <a:shade val="80000"/>
+      </a:schemeClr>
+    </dgm:linClrLst>
+    <dgm:effectClrLst/>
+    <dgm:txLinClrLst/>
+    <dgm:txFillClrLst meth="repeat">
+      <a:schemeClr val="tx1"/>
+    </dgm:txFillClrLst>
+    <dgm:txEffectClrLst/>
+  </dgm:styleLbl>
+  <dgm:styleLbl name="fgAcc1">
+    <dgm:fillClrLst meth="repeat">
+      <a:schemeClr val="lt1">
+        <a:alpha val="90000"/>
+      </a:schemeClr>
+    </dgm:fillClrLst>
+    <dgm:linClrLst meth="repeat">
+      <a:schemeClr val="accent1"/>
+    </dgm:linClrLst>
+    <dgm:effectClrLst/>
+    <dgm:txLinClrLst/>
+    <dgm:txFillClrLst meth="repeat">
+      <a:schemeClr val="dk1"/>
+    </dgm:txFillClrLst>
+    <dgm:txEffectClrLst/>
+  </dgm:styleLbl>
+  <dgm:styleLbl name="conFgAcc1">
+    <dgm:fillClrLst meth="repeat">
+      <a:schemeClr val="lt1">
+        <a:alpha val="90000"/>
+      </a:schemeClr>
+    </dgm:fillClrLst>
+    <dgm:linClrLst meth="repeat">
+      <a:schemeClr val="accent1"/>
+    </dgm:linClrLst>
+    <dgm:effectClrLst/>
+    <dgm:txLinClrLst/>
+    <dgm:txFillClrLst meth="repeat">
+      <a:schemeClr val="dk1"/>
+    </dgm:txFillClrLst>
+    <dgm:txEffectClrLst/>
+  </dgm:styleLbl>
+  <dgm:styleLbl name="alignAcc1">
+    <dgm:fillClrLst meth="repeat">
+      <a:schemeClr val="lt1">
+        <a:alpha val="90000"/>
+      </a:schemeClr>
+    </dgm:fillClrLst>
+    <dgm:linClrLst meth="repeat">
+      <a:schemeClr val="accent1"/>
+    </dgm:linClrLst>
+    <dgm:effectClrLst/>
+    <dgm:txLinClrLst/>
+    <dgm:txFillClrLst meth="repeat">
+      <a:schemeClr val="dk1"/>
+    </dgm:txFillClrLst>
+    <dgm:txEffectClrLst/>
+  </dgm:styleLbl>
+  <dgm:styleLbl name="trAlignAcc1">
+    <dgm:fillClrLst meth="repeat">
+      <a:schemeClr val="lt1">
+        <a:alpha val="40000"/>
+      </a:schemeClr>
+    </dgm:fillClrLst>
+    <dgm:linClrLst meth="repeat">
+      <a:schemeClr val="accent1"/>
+    </dgm:linClrLst>
+    <dgm:effectClrLst/>
+    <dgm:txLinClrLst/>
+    <dgm:txFillClrLst meth="repeat">
+      <a:schemeClr val="dk1"/>
+    </dgm:txFillClrLst>
+    <dgm:txEffectClrLst/>
+  </dgm:styleLbl>
+  <dgm:styleLbl name="bgAcc1">
+    <dgm:fillClrLst meth="repeat">
+      <a:schemeClr val="lt1">
+        <a:alpha val="90000"/>
+      </a:schemeClr>
+    </dgm:fillClrLst>
+    <dgm:linClrLst meth="repeat">
+      <a:schemeClr val="accent1"/>
+    </dgm:linClrLst>
+    <dgm:effectClrLst/>
+    <dgm:txLinClrLst/>
+    <dgm:txFillClrLst meth="repeat">
+      <a:schemeClr val="dk1"/>
+    </dgm:txFillClrLst>
+    <dgm:txEffectClrLst/>
+  </dgm:styleLbl>
+  <dgm:styleLbl name="solidFgAcc1">
+    <dgm:fillClrLst meth="repeat">
+      <a:schemeClr val="lt1"/>
+    </dgm:fillClrLst>
+    <dgm:linClrLst meth="repeat">
+      <a:schemeClr val="accent1"/>
+    </dgm:linClrLst>
+    <dgm:effectClrLst/>
+    <dgm:txLinClrLst/>
+    <dgm:txFillClrLst meth="repeat">
+      <a:schemeClr val="dk1"/>
+    </dgm:txFillClrLst>
+    <dgm:txEffectClrLst/>
+  </dgm:styleLbl>
+  <dgm:styleLbl name="solidAlignAcc1">
+    <dgm:fillClrLst meth="repeat">
+      <a:schemeClr val="lt1"/>
+    </dgm:fillClrLst>
+    <dgm:linClrLst meth="repeat">
+      <a:schemeClr val="accent1"/>
+    </dgm:linClrLst>
+    <dgm:effectClrLst/>
+    <dgm:txLinClrLst/>
+    <dgm:txFillClrLst meth="repeat">
+      <a:schemeClr val="dk1"/>
+    </dgm:txFillClrLst>
+    <dgm:txEffectClrLst/>
+  </dgm:styleLbl>
+  <dgm:styleLbl name="solidBgAcc1">
+    <dgm:fillClrLst meth="repeat">
+      <a:schemeClr val="lt1"/>
+    </dgm:fillClrLst>
+    <dgm:linClrLst meth="repeat">
+      <a:schemeClr val="accent1"/>
+    </dgm:linClrLst>
+    <dgm:effectClrLst/>
+    <dgm:txLinClrLst/>
+    <dgm:txFillClrLst meth="repeat">
+      <a:schemeClr val="dk1"/>
+    </dgm:txFillClrLst>
+    <dgm:txEffectClrLst/>
+  </dgm:styleLbl>
+  <dgm:styleLbl name="fgAccFollowNode1">
+    <dgm:fillClrLst meth="repeat">
+      <a:schemeClr val="accent1">
+        <a:alpha val="90000"/>
+        <a:tint val="40000"/>
+      </a:schemeClr>
+    </dgm:fillClrLst>
+    <dgm:linClrLst meth="repeat">
+      <a:schemeClr val="accent1">
+        <a:alpha val="90000"/>
+        <a:tint val="40000"/>
+      </a:schemeClr>
+    </dgm:linClrLst>
+    <dgm:effectClrLst/>
+    <dgm:txLinClrLst/>
+    <dgm:txFillClrLst meth="repeat">
+      <a:schemeClr val="dk1"/>
+    </dgm:txFillClrLst>
+    <dgm:txEffectClrLst/>
+  </dgm:styleLbl>
+  <dgm:styleLbl name="alignAccFollowNode1">
+    <dgm:fillClrLst meth="repeat">
+      <a:schemeClr val="accent1">
+        <a:alpha val="90000"/>
+        <a:tint val="40000"/>
+      </a:schemeClr>
+    </dgm:fillClrLst>
+    <dgm:linClrLst meth="repeat">
+      <a:schemeClr val="accent1">
+        <a:alpha val="90000"/>
+        <a:tint val="40000"/>
+      </a:schemeClr>
+    </dgm:linClrLst>
+    <dgm:effectClrLst/>
+    <dgm:txLinClrLst/>
+    <dgm:txFillClrLst meth="repeat">
+      <a:schemeClr val="dk1"/>
+    </dgm:txFillClrLst>
+    <dgm:txEffectClrLst/>
+  </dgm:styleLbl>
+  <dgm:styleLbl name="bgAccFollowNode1">
+    <dgm:fillClrLst meth="repeat">
+      <a:schemeClr val="accent1">
+        <a:alpha val="90000"/>
+        <a:tint val="40000"/>
+      </a:schemeClr>
+    </dgm:fillClrLst>
+    <dgm:linClrLst meth="repeat">
+      <a:schemeClr val="accent1">
+        <a:alpha val="90000"/>
+        <a:tint val="40000"/>
+      </a:schemeClr>
+    </dgm:linClrLst>
+    <dgm:effectClrLst/>
+    <dgm:txLinClrLst/>
+    <dgm:txFillClrLst meth="repeat">
+      <a:schemeClr val="dk1"/>
+    </dgm:txFillClrLst>
+    <dgm:txEffectClrLst/>
+  </dgm:styleLbl>
+  <dgm:styleLbl name="fgAcc0">
+    <dgm:fillClrLst meth="repeat">
+      <a:schemeClr val="lt1">
+        <a:alpha val="90000"/>
+      </a:schemeClr>
+    </dgm:fillClrLst>
+    <dgm:linClrLst meth="repeat">
+      <a:schemeClr val="accent1"/>
+    </dgm:linClrLst>
+    <dgm:effectClrLst/>
+    <dgm:txLinClrLst/>
+    <dgm:txFillClrLst meth="repeat">
+      <a:schemeClr val="dk1"/>
+    </dgm:txFillClrLst>
+    <dgm:txEffectClrLst/>
+  </dgm:styleLbl>
+  <dgm:styleLbl name="fgAcc2">
+    <dgm:fillClrLst meth="repeat">
+      <a:schemeClr val="lt1">
+        <a:alpha val="90000"/>
+      </a:schemeClr>
+    </dgm:fillClrLst>
+    <dgm:linClrLst meth="repeat">
+      <a:schemeClr val="accent1"/>
+    </dgm:linClrLst>
+    <dgm:effectClrLst/>
+    <dgm:txLinClrLst/>
+    <dgm:txFillClrLst meth="repeat">
+      <a:schemeClr val="dk1"/>
+    </dgm:txFillClrLst>
+    <dgm:txEffectClrLst/>
+  </dgm:styleLbl>
+  <dgm:styleLbl name="fgAcc3">
+    <dgm:fillClrLst meth="repeat">
+      <a:schemeClr val="lt1">
+        <a:alpha val="90000"/>
+      </a:schemeClr>
+    </dgm:fillClrLst>
+    <dgm:linClrLst meth="repeat">
+      <a:schemeClr val="accent1"/>
+    </dgm:linClrLst>
+    <dgm:effectClrLst/>
+    <dgm:txLinClrLst/>
+    <dgm:txFillClrLst meth="repeat">
+      <a:schemeClr val="dk1"/>
+    </dgm:txFillClrLst>
+    <dgm:txEffectClrLst/>
+  </dgm:styleLbl>
+  <dgm:styleLbl name="fgAcc4">
+    <dgm:fillClrLst meth="repeat">
+      <a:schemeClr val="lt1">
+        <a:alpha val="90000"/>
+      </a:schemeClr>
+    </dgm:fillClrLst>
+    <dgm:linClrLst meth="repeat">
+      <a:schemeClr val="accent1"/>
+    </dgm:linClrLst>
+    <dgm:effectClrLst/>
+    <dgm:txLinClrLst/>
+    <dgm:txFillClrLst meth="repeat">
+      <a:schemeClr val="dk1"/>
+    </dgm:txFillClrLst>
+    <dgm:txEffectClrLst/>
+  </dgm:styleLbl>
+  <dgm:styleLbl name="bgShp">
+    <dgm:fillClrLst meth="repeat">
+      <a:schemeClr val="accent1">
+        <a:tint val="40000"/>
+      </a:schemeClr>
+    </dgm:fillClrLst>
+    <dgm:linClrLst meth="repeat">
+      <a:schemeClr val="accent1"/>
+    </dgm:linClrLst>
+    <dgm:effectClrLst/>
+    <dgm:txLinClrLst/>
+    <dgm:txFillClrLst meth="repeat">
+      <a:schemeClr val="dk1"/>
+    </dgm:txFillClrLst>
+    <dgm:txEffectClrLst/>
+  </dgm:styleLbl>
+  <dgm:styleLbl name="dkBgShp">
+    <dgm:fillClrLst meth="repeat">
+      <a:schemeClr val="accent1">
+        <a:shade val="80000"/>
+      </a:schemeClr>
+    </dgm:fillClrLst>
+    <dgm:linClrLst meth="repeat">
+      <a:schemeClr val="accent1"/>
+    </dgm:linClrLst>
+    <dgm:effectClrLst/>
+    <dgm:txLinClrLst/>
+    <dgm:txFillClrLst meth="repeat">
+      <a:schemeClr val="lt1"/>
+    </dgm:txFillClrLst>
+    <dgm:txEffectClrLst/>
+  </dgm:styleLbl>
+  <dgm:styleLbl name="trBgShp">
+    <dgm:fillClrLst meth="repeat">
+      <a:schemeClr val="accent1">
+        <a:tint val="50000"/>
+        <a:alpha val="40000"/>
+      </a:schemeClr>
+    </dgm:fillClrLst>
+    <dgm:linClrLst meth="repeat">
+      <a:schemeClr val="accent1"/>
+    </dgm:linClrLst>
+    <dgm:effectClrLst/>
+    <dgm:txLinClrLst/>
+    <dgm:txFillClrLst meth="repeat">
+      <a:schemeClr val="lt1"/>
+    </dgm:txFillClrLst>
+    <dgm:txEffectClrLst/>
+  </dgm:styleLbl>
+  <dgm:styleLbl name="fgShp">
+    <dgm:fillClrLst meth="repeat">
+      <a:schemeClr val="accent1">
+        <a:tint val="60000"/>
+      </a:schemeClr>
+    </dgm:fillClrLst>
+    <dgm:linClrLst meth="repeat">
+      <a:schemeClr val="lt1"/>
+    </dgm:linClrLst>
+    <dgm:effectClrLst/>
+    <dgm:txLinClrLst/>
+    <dgm:txFillClrLst meth="repeat">
+      <a:schemeClr val="dk1"/>
+    </dgm:txFillClrLst>
+    <dgm:txEffectClrLst/>
+  </dgm:styleLbl>
+  <dgm:styleLbl name="revTx">
+    <dgm:fillClrLst meth="repeat">
+      <a:schemeClr val="lt1">
+        <a:alpha val="0"/>
+      </a:schemeClr>
+    </dgm:fillClrLst>
+    <dgm:linClrLst meth="repeat">
+      <a:schemeClr val="dk1">
+        <a:alpha val="0"/>
+      </a:schemeClr>
+    </dgm:linClrLst>
+    <dgm:effectClrLst/>
+    <dgm:txLinClrLst/>
+    <dgm:txFillClrLst meth="repeat">
+      <a:schemeClr val="tx1"/>
+    </dgm:txFillClrLst>
+    <dgm:txEffectClrLst/>
+  </dgm:styleLbl>
+</dgm:colorsDef>
+</file>
+
+<file path=ppt/diagrams/data1.xml><?xml version="1.0" encoding="utf-8"?>
+<dgm:dataModel xmlns:dgm="http://schemas.openxmlformats.org/drawingml/2006/diagram" xmlns:a="http://schemas.openxmlformats.org/drawingml/2006/main">
+  <dgm:ptLst>
+    <dgm:pt modelId="{15570CFE-176A-42D4-AAC1-8AD6679F3099}" type="doc">
+      <dgm:prSet loTypeId="urn:microsoft.com/office/officeart/2005/8/layout/default" loCatId="list" qsTypeId="urn:microsoft.com/office/officeart/2005/8/quickstyle/simple1" qsCatId="simple" csTypeId="urn:microsoft.com/office/officeart/2005/8/colors/accent1_2" csCatId="accent1" phldr="1"/>
+      <dgm:spPr/>
+      <dgm:t>
+        <a:bodyPr/>
+        <a:lstStyle/>
+        <a:p>
+          <a:endParaRPr lang="de-DE"/>
+        </a:p>
+      </dgm:t>
+    </dgm:pt>
+    <dgm:pt modelId="{C9C8D41B-7B10-406A-96D2-22E2F1C33AB7}">
+      <dgm:prSet phldrT="[Text]"/>
+      <dgm:spPr>
+        <a:solidFill>
+          <a:srgbClr val="1AB394"/>
+        </a:solidFill>
+      </dgm:spPr>
+      <dgm:t>
+        <a:bodyPr/>
+        <a:lstStyle/>
+        <a:p>
+          <a:r>
+            <a:rPr lang="de-DE" dirty="0" smtClean="0">
+              <a:solidFill>
+                <a:schemeClr val="tx1"/>
+              </a:solidFill>
+            </a:rPr>
+            <a:t>XML Import und Export</a:t>
+          </a:r>
+          <a:endParaRPr lang="de-DE" dirty="0">
+            <a:solidFill>
+              <a:schemeClr val="tx1"/>
+            </a:solidFill>
+          </a:endParaRPr>
+        </a:p>
+      </dgm:t>
+    </dgm:pt>
+    <dgm:pt modelId="{F5367B3D-351E-45E3-B587-44DF94618FEE}" type="parTrans" cxnId="{2B1D6F97-7582-4CDE-9AFF-0715446195B8}">
+      <dgm:prSet/>
+      <dgm:spPr/>
+      <dgm:t>
+        <a:bodyPr/>
+        <a:lstStyle/>
+        <a:p>
+          <a:endParaRPr lang="de-DE"/>
+        </a:p>
+      </dgm:t>
+    </dgm:pt>
+    <dgm:pt modelId="{06A49C23-CE42-4576-9F90-C02A1BDC69CF}" type="sibTrans" cxnId="{2B1D6F97-7582-4CDE-9AFF-0715446195B8}">
+      <dgm:prSet/>
+      <dgm:spPr/>
+      <dgm:t>
+        <a:bodyPr/>
+        <a:lstStyle/>
+        <a:p>
+          <a:endParaRPr lang="de-DE"/>
+        </a:p>
+      </dgm:t>
+    </dgm:pt>
+    <dgm:pt modelId="{38D4E6C4-4549-4E88-8B8A-8B680B710C67}">
+      <dgm:prSet phldrT="[Text]"/>
+      <dgm:spPr>
+        <a:solidFill>
+          <a:srgbClr val="1AB394"/>
+        </a:solidFill>
+      </dgm:spPr>
+      <dgm:t>
+        <a:bodyPr/>
+        <a:lstStyle/>
+        <a:p>
+          <a:r>
+            <a:rPr lang="de-DE" dirty="0" smtClean="0">
+              <a:solidFill>
+                <a:schemeClr val="tx1"/>
+              </a:solidFill>
+            </a:rPr>
+            <a:t>Mengenplanung</a:t>
+          </a:r>
+        </a:p>
+      </dgm:t>
+    </dgm:pt>
+    <dgm:pt modelId="{B0AA0DF8-BDB2-417B-BBB0-92CEB2F51651}" type="parTrans" cxnId="{11CBA53F-EECB-4104-8BDE-02E45FCF9862}">
+      <dgm:prSet/>
+      <dgm:spPr/>
+      <dgm:t>
+        <a:bodyPr/>
+        <a:lstStyle/>
+        <a:p>
+          <a:endParaRPr lang="de-DE"/>
+        </a:p>
+      </dgm:t>
+    </dgm:pt>
+    <dgm:pt modelId="{250E8339-2135-4C17-9CD0-2F4B9A749CAB}" type="sibTrans" cxnId="{11CBA53F-EECB-4104-8BDE-02E45FCF9862}">
+      <dgm:prSet/>
+      <dgm:spPr/>
+      <dgm:t>
+        <a:bodyPr/>
+        <a:lstStyle/>
+        <a:p>
+          <a:endParaRPr lang="de-DE"/>
+        </a:p>
+      </dgm:t>
+    </dgm:pt>
+    <dgm:pt modelId="{DD4F70C2-C2FB-4DED-B346-3F46B5C8C744}">
+      <dgm:prSet phldrT="[Text]"/>
+      <dgm:spPr>
+        <a:solidFill>
+          <a:srgbClr val="1AB394"/>
+        </a:solidFill>
+      </dgm:spPr>
+      <dgm:t>
+        <a:bodyPr/>
+        <a:lstStyle/>
+        <a:p>
+          <a:r>
+            <a:rPr lang="de-DE" dirty="0" smtClean="0">
+              <a:solidFill>
+                <a:schemeClr val="tx1"/>
+              </a:solidFill>
+            </a:rPr>
+            <a:t>Bestellverwaltung</a:t>
+          </a:r>
+          <a:endParaRPr lang="de-DE" dirty="0">
+            <a:solidFill>
+              <a:schemeClr val="tx1"/>
+            </a:solidFill>
+          </a:endParaRPr>
+        </a:p>
+      </dgm:t>
+    </dgm:pt>
+    <dgm:pt modelId="{7A832436-42A4-4673-B9F9-8CF396803C12}" type="parTrans" cxnId="{4772B205-1529-49B3-AEF4-A7B2C4BC06E4}">
+      <dgm:prSet/>
+      <dgm:spPr/>
+      <dgm:t>
+        <a:bodyPr/>
+        <a:lstStyle/>
+        <a:p>
+          <a:endParaRPr lang="de-DE"/>
+        </a:p>
+      </dgm:t>
+    </dgm:pt>
+    <dgm:pt modelId="{094EE5D4-5226-49BB-B859-9A068CC5FF9B}" type="sibTrans" cxnId="{4772B205-1529-49B3-AEF4-A7B2C4BC06E4}">
+      <dgm:prSet/>
+      <dgm:spPr/>
+      <dgm:t>
+        <a:bodyPr/>
+        <a:lstStyle/>
+        <a:p>
+          <a:endParaRPr lang="de-DE"/>
+        </a:p>
+      </dgm:t>
+    </dgm:pt>
+    <dgm:pt modelId="{BA8E8704-8643-4C37-8206-5BEA6687719D}">
+      <dgm:prSet phldrT="[Text]"/>
+      <dgm:spPr>
+        <a:solidFill>
+          <a:srgbClr val="1AB394"/>
+        </a:solidFill>
+      </dgm:spPr>
+      <dgm:t>
+        <a:bodyPr/>
+        <a:lstStyle/>
+        <a:p>
+          <a:r>
+            <a:rPr lang="de-DE" dirty="0" smtClean="0">
+              <a:solidFill>
+                <a:schemeClr val="tx1"/>
+              </a:solidFill>
+            </a:rPr>
+            <a:t>Kapazitätsplanung</a:t>
+          </a:r>
+          <a:endParaRPr lang="de-DE" dirty="0">
+            <a:solidFill>
+              <a:schemeClr val="tx1"/>
+            </a:solidFill>
+          </a:endParaRPr>
+        </a:p>
+      </dgm:t>
+    </dgm:pt>
+    <dgm:pt modelId="{EE9D6AA5-8C38-4C00-AF28-1F30ADEA6349}" type="parTrans" cxnId="{597DF89F-37AC-4761-9504-CAAAA0EE0EA9}">
+      <dgm:prSet/>
+      <dgm:spPr/>
+      <dgm:t>
+        <a:bodyPr/>
+        <a:lstStyle/>
+        <a:p>
+          <a:endParaRPr lang="de-DE"/>
+        </a:p>
+      </dgm:t>
+    </dgm:pt>
+    <dgm:pt modelId="{090171B2-A243-4644-AAFE-10F35FB2819E}" type="sibTrans" cxnId="{597DF89F-37AC-4761-9504-CAAAA0EE0EA9}">
+      <dgm:prSet/>
+      <dgm:spPr/>
+      <dgm:t>
+        <a:bodyPr/>
+        <a:lstStyle/>
+        <a:p>
+          <a:endParaRPr lang="de-DE"/>
+        </a:p>
+      </dgm:t>
+    </dgm:pt>
+    <dgm:pt modelId="{B36B14EA-1ECC-4FB8-B25E-2D571190B8BE}">
+      <dgm:prSet phldrT="[Text]"/>
+      <dgm:spPr>
+        <a:solidFill>
+          <a:srgbClr val="1AB394"/>
+        </a:solidFill>
+      </dgm:spPr>
+      <dgm:t>
+        <a:bodyPr/>
+        <a:lstStyle/>
+        <a:p>
+          <a:r>
+            <a:rPr lang="de-DE" dirty="0" smtClean="0">
+              <a:solidFill>
+                <a:schemeClr val="tx1"/>
+              </a:solidFill>
+            </a:rPr>
+            <a:t>Analyse und Statistiken</a:t>
+          </a:r>
+          <a:endParaRPr lang="de-DE" dirty="0">
+            <a:solidFill>
+              <a:schemeClr val="tx1"/>
+            </a:solidFill>
+          </a:endParaRPr>
+        </a:p>
+      </dgm:t>
+    </dgm:pt>
+    <dgm:pt modelId="{96B74648-A0B0-4FAA-BE1F-AD7F4449A9FD}" type="parTrans" cxnId="{3543D507-549B-43C1-B0D9-5E4BBA015EA6}">
+      <dgm:prSet/>
+      <dgm:spPr/>
+      <dgm:t>
+        <a:bodyPr/>
+        <a:lstStyle/>
+        <a:p>
+          <a:endParaRPr lang="de-DE"/>
+        </a:p>
+      </dgm:t>
+    </dgm:pt>
+    <dgm:pt modelId="{D055B043-DD5B-4C75-8893-031D514CBC1F}" type="sibTrans" cxnId="{3543D507-549B-43C1-B0D9-5E4BBA015EA6}">
+      <dgm:prSet/>
+      <dgm:spPr/>
+      <dgm:t>
+        <a:bodyPr/>
+        <a:lstStyle/>
+        <a:p>
+          <a:endParaRPr lang="de-DE"/>
+        </a:p>
+      </dgm:t>
+    </dgm:pt>
+    <dgm:pt modelId="{A442E94A-5443-440C-9CD4-6CDD577A8718}">
+      <dgm:prSet phldrT="[Text]"/>
+      <dgm:spPr>
+        <a:solidFill>
+          <a:srgbClr val="1AB394"/>
+        </a:solidFill>
+      </dgm:spPr>
+      <dgm:t>
+        <a:bodyPr/>
+        <a:lstStyle/>
+        <a:p>
+          <a:r>
+            <a:rPr lang="de-DE" dirty="0" smtClean="0">
+              <a:solidFill>
+                <a:schemeClr val="tx1"/>
+              </a:solidFill>
+            </a:rPr>
+            <a:t>Benutzerverwaltung</a:t>
+          </a:r>
+          <a:endParaRPr lang="de-DE" dirty="0">
+            <a:solidFill>
+              <a:schemeClr val="tx1"/>
+            </a:solidFill>
+          </a:endParaRPr>
+        </a:p>
+      </dgm:t>
+    </dgm:pt>
+    <dgm:pt modelId="{43DEFB6F-86B2-44FD-966C-3E716D2A19B8}" type="parTrans" cxnId="{086229D5-864C-44CD-B581-913A6804C1A4}">
+      <dgm:prSet/>
+      <dgm:spPr/>
+      <dgm:t>
+        <a:bodyPr/>
+        <a:lstStyle/>
+        <a:p>
+          <a:endParaRPr lang="de-DE"/>
+        </a:p>
+      </dgm:t>
+    </dgm:pt>
+    <dgm:pt modelId="{C69AE415-83B2-403B-B8EF-8BD4CF4B3DE6}" type="sibTrans" cxnId="{086229D5-864C-44CD-B581-913A6804C1A4}">
+      <dgm:prSet/>
+      <dgm:spPr/>
+      <dgm:t>
+        <a:bodyPr/>
+        <a:lstStyle/>
+        <a:p>
+          <a:endParaRPr lang="de-DE"/>
+        </a:p>
+      </dgm:t>
+    </dgm:pt>
+    <dgm:pt modelId="{C71A8E77-E2AB-4BC4-9DC8-CFD5CFBC13E8}" type="pres">
+      <dgm:prSet presAssocID="{15570CFE-176A-42D4-AAC1-8AD6679F3099}" presName="diagram" presStyleCnt="0">
+        <dgm:presLayoutVars>
+          <dgm:dir/>
+          <dgm:resizeHandles val="exact"/>
+        </dgm:presLayoutVars>
+      </dgm:prSet>
+      <dgm:spPr/>
+    </dgm:pt>
+    <dgm:pt modelId="{216F723B-75FC-4AFB-987A-2D5ADAAD1426}" type="pres">
+      <dgm:prSet presAssocID="{C9C8D41B-7B10-406A-96D2-22E2F1C33AB7}" presName="node" presStyleLbl="node1" presStyleIdx="0" presStyleCnt="6" custLinFactNeighborY="2058">
+        <dgm:presLayoutVars>
+          <dgm:bulletEnabled val="1"/>
+        </dgm:presLayoutVars>
+      </dgm:prSet>
+      <dgm:spPr/>
+    </dgm:pt>
+    <dgm:pt modelId="{D47FBC94-3FB8-4DAE-8201-C34496E8B357}" type="pres">
+      <dgm:prSet presAssocID="{06A49C23-CE42-4576-9F90-C02A1BDC69CF}" presName="sibTrans" presStyleCnt="0"/>
+      <dgm:spPr/>
+    </dgm:pt>
+    <dgm:pt modelId="{619D394C-7BE8-4B4A-B466-58591A5D7E8C}" type="pres">
+      <dgm:prSet presAssocID="{38D4E6C4-4549-4E88-8B8A-8B680B710C67}" presName="node" presStyleLbl="node1" presStyleIdx="1" presStyleCnt="6" custLinFactNeighborY="2058">
+        <dgm:presLayoutVars>
+          <dgm:bulletEnabled val="1"/>
+        </dgm:presLayoutVars>
+      </dgm:prSet>
+      <dgm:spPr/>
+    </dgm:pt>
+    <dgm:pt modelId="{50B16854-12C6-4FB2-B128-EB9E31BE4F1F}" type="pres">
+      <dgm:prSet presAssocID="{250E8339-2135-4C17-9CD0-2F4B9A749CAB}" presName="sibTrans" presStyleCnt="0"/>
+      <dgm:spPr/>
+    </dgm:pt>
+    <dgm:pt modelId="{6E75909A-DD64-400E-8062-DB5DE1EFEEAB}" type="pres">
+      <dgm:prSet presAssocID="{DD4F70C2-C2FB-4DED-B346-3F46B5C8C744}" presName="node" presStyleLbl="node1" presStyleIdx="2" presStyleCnt="6" custLinFactNeighborY="2058">
+        <dgm:presLayoutVars>
+          <dgm:bulletEnabled val="1"/>
+        </dgm:presLayoutVars>
+      </dgm:prSet>
+      <dgm:spPr/>
+    </dgm:pt>
+    <dgm:pt modelId="{35E5F711-7C9C-4BCD-BB91-94E1227A010F}" type="pres">
+      <dgm:prSet presAssocID="{094EE5D4-5226-49BB-B859-9A068CC5FF9B}" presName="sibTrans" presStyleCnt="0"/>
+      <dgm:spPr/>
+    </dgm:pt>
+    <dgm:pt modelId="{D7A8DA2B-CFD5-4A8F-8484-9EC1815A5D06}" type="pres">
+      <dgm:prSet presAssocID="{BA8E8704-8643-4C37-8206-5BEA6687719D}" presName="node" presStyleLbl="node1" presStyleIdx="3" presStyleCnt="6" custLinFactNeighborY="2058">
+        <dgm:presLayoutVars>
+          <dgm:bulletEnabled val="1"/>
+        </dgm:presLayoutVars>
+      </dgm:prSet>
+      <dgm:spPr/>
+    </dgm:pt>
+    <dgm:pt modelId="{301B742E-25EE-41A0-98DD-31D38D99E360}" type="pres">
+      <dgm:prSet presAssocID="{090171B2-A243-4644-AAFE-10F35FB2819E}" presName="sibTrans" presStyleCnt="0"/>
+      <dgm:spPr/>
+    </dgm:pt>
+    <dgm:pt modelId="{B748685B-D4ED-4ECE-88A7-9074F0403905}" type="pres">
+      <dgm:prSet presAssocID="{B36B14EA-1ECC-4FB8-B25E-2D571190B8BE}" presName="node" presStyleLbl="node1" presStyleIdx="4" presStyleCnt="6" custLinFactNeighborY="2058">
+        <dgm:presLayoutVars>
+          <dgm:bulletEnabled val="1"/>
+        </dgm:presLayoutVars>
+      </dgm:prSet>
+      <dgm:spPr/>
+      <dgm:t>
+        <a:bodyPr/>
+        <a:lstStyle/>
+        <a:p>
+          <a:endParaRPr lang="de-DE"/>
+        </a:p>
+      </dgm:t>
+    </dgm:pt>
+    <dgm:pt modelId="{8C26BE86-1260-45ED-A57B-4DB8A6563C4B}" type="pres">
+      <dgm:prSet presAssocID="{D055B043-DD5B-4C75-8893-031D514CBC1F}" presName="sibTrans" presStyleCnt="0"/>
+      <dgm:spPr/>
+    </dgm:pt>
+    <dgm:pt modelId="{3FCC99D6-4692-4327-A8D6-7B22192D170C}" type="pres">
+      <dgm:prSet presAssocID="{A442E94A-5443-440C-9CD4-6CDD577A8718}" presName="node" presStyleLbl="node1" presStyleIdx="5" presStyleCnt="6" custLinFactNeighborY="2058">
+        <dgm:presLayoutVars>
+          <dgm:bulletEnabled val="1"/>
+        </dgm:presLayoutVars>
+      </dgm:prSet>
+      <dgm:spPr/>
+    </dgm:pt>
+  </dgm:ptLst>
+  <dgm:cxnLst>
+    <dgm:cxn modelId="{AB317DB7-3C14-4642-92F5-D4B0CB06DB3A}" type="presOf" srcId="{C9C8D41B-7B10-406A-96D2-22E2F1C33AB7}" destId="{216F723B-75FC-4AFB-987A-2D5ADAAD1426}" srcOrd="0" destOrd="0" presId="urn:microsoft.com/office/officeart/2005/8/layout/default"/>
+    <dgm:cxn modelId="{16A62162-E5FD-4B6A-ABDE-3AEF1F479B18}" type="presOf" srcId="{DD4F70C2-C2FB-4DED-B346-3F46B5C8C744}" destId="{6E75909A-DD64-400E-8062-DB5DE1EFEEAB}" srcOrd="0" destOrd="0" presId="urn:microsoft.com/office/officeart/2005/8/layout/default"/>
+    <dgm:cxn modelId="{086229D5-864C-44CD-B581-913A6804C1A4}" srcId="{15570CFE-176A-42D4-AAC1-8AD6679F3099}" destId="{A442E94A-5443-440C-9CD4-6CDD577A8718}" srcOrd="5" destOrd="0" parTransId="{43DEFB6F-86B2-44FD-966C-3E716D2A19B8}" sibTransId="{C69AE415-83B2-403B-B8EF-8BD4CF4B3DE6}"/>
+    <dgm:cxn modelId="{F36DCE52-D301-42E5-A943-2BE4279AC63F}" type="presOf" srcId="{15570CFE-176A-42D4-AAC1-8AD6679F3099}" destId="{C71A8E77-E2AB-4BC4-9DC8-CFD5CFBC13E8}" srcOrd="0" destOrd="0" presId="urn:microsoft.com/office/officeart/2005/8/layout/default"/>
+    <dgm:cxn modelId="{4772B205-1529-49B3-AEF4-A7B2C4BC06E4}" srcId="{15570CFE-176A-42D4-AAC1-8AD6679F3099}" destId="{DD4F70C2-C2FB-4DED-B346-3F46B5C8C744}" srcOrd="2" destOrd="0" parTransId="{7A832436-42A4-4673-B9F9-8CF396803C12}" sibTransId="{094EE5D4-5226-49BB-B859-9A068CC5FF9B}"/>
+    <dgm:cxn modelId="{3543D507-549B-43C1-B0D9-5E4BBA015EA6}" srcId="{15570CFE-176A-42D4-AAC1-8AD6679F3099}" destId="{B36B14EA-1ECC-4FB8-B25E-2D571190B8BE}" srcOrd="4" destOrd="0" parTransId="{96B74648-A0B0-4FAA-BE1F-AD7F4449A9FD}" sibTransId="{D055B043-DD5B-4C75-8893-031D514CBC1F}"/>
+    <dgm:cxn modelId="{11CBA53F-EECB-4104-8BDE-02E45FCF9862}" srcId="{15570CFE-176A-42D4-AAC1-8AD6679F3099}" destId="{38D4E6C4-4549-4E88-8B8A-8B680B710C67}" srcOrd="1" destOrd="0" parTransId="{B0AA0DF8-BDB2-417B-BBB0-92CEB2F51651}" sibTransId="{250E8339-2135-4C17-9CD0-2F4B9A749CAB}"/>
+    <dgm:cxn modelId="{597DF89F-37AC-4761-9504-CAAAA0EE0EA9}" srcId="{15570CFE-176A-42D4-AAC1-8AD6679F3099}" destId="{BA8E8704-8643-4C37-8206-5BEA6687719D}" srcOrd="3" destOrd="0" parTransId="{EE9D6AA5-8C38-4C00-AF28-1F30ADEA6349}" sibTransId="{090171B2-A243-4644-AAFE-10F35FB2819E}"/>
+    <dgm:cxn modelId="{F71B9163-F4BA-4A8F-86B3-CA40A4019DD5}" type="presOf" srcId="{38D4E6C4-4549-4E88-8B8A-8B680B710C67}" destId="{619D394C-7BE8-4B4A-B466-58591A5D7E8C}" srcOrd="0" destOrd="0" presId="urn:microsoft.com/office/officeart/2005/8/layout/default"/>
+    <dgm:cxn modelId="{224AA8FC-87E5-446E-8F7B-6F56EA1089E5}" type="presOf" srcId="{BA8E8704-8643-4C37-8206-5BEA6687719D}" destId="{D7A8DA2B-CFD5-4A8F-8484-9EC1815A5D06}" srcOrd="0" destOrd="0" presId="urn:microsoft.com/office/officeart/2005/8/layout/default"/>
+    <dgm:cxn modelId="{78B9C3A3-65C0-4397-861C-041B78F0348D}" type="presOf" srcId="{B36B14EA-1ECC-4FB8-B25E-2D571190B8BE}" destId="{B748685B-D4ED-4ECE-88A7-9074F0403905}" srcOrd="0" destOrd="0" presId="urn:microsoft.com/office/officeart/2005/8/layout/default"/>
+    <dgm:cxn modelId="{7B64E452-1F3A-47B0-BE6C-442FE2E4446A}" type="presOf" srcId="{A442E94A-5443-440C-9CD4-6CDD577A8718}" destId="{3FCC99D6-4692-4327-A8D6-7B22192D170C}" srcOrd="0" destOrd="0" presId="urn:microsoft.com/office/officeart/2005/8/layout/default"/>
+    <dgm:cxn modelId="{2B1D6F97-7582-4CDE-9AFF-0715446195B8}" srcId="{15570CFE-176A-42D4-AAC1-8AD6679F3099}" destId="{C9C8D41B-7B10-406A-96D2-22E2F1C33AB7}" srcOrd="0" destOrd="0" parTransId="{F5367B3D-351E-45E3-B587-44DF94618FEE}" sibTransId="{06A49C23-CE42-4576-9F90-C02A1BDC69CF}"/>
+    <dgm:cxn modelId="{AFFFD968-155A-41D2-9B6C-D42E824B3780}" type="presParOf" srcId="{C71A8E77-E2AB-4BC4-9DC8-CFD5CFBC13E8}" destId="{216F723B-75FC-4AFB-987A-2D5ADAAD1426}" srcOrd="0" destOrd="0" presId="urn:microsoft.com/office/officeart/2005/8/layout/default"/>
+    <dgm:cxn modelId="{81B6F9D8-82CD-4F10-BD4F-00348506300F}" type="presParOf" srcId="{C71A8E77-E2AB-4BC4-9DC8-CFD5CFBC13E8}" destId="{D47FBC94-3FB8-4DAE-8201-C34496E8B357}" srcOrd="1" destOrd="0" presId="urn:microsoft.com/office/officeart/2005/8/layout/default"/>
+    <dgm:cxn modelId="{C683592D-9104-4770-AB09-750CD73A677C}" type="presParOf" srcId="{C71A8E77-E2AB-4BC4-9DC8-CFD5CFBC13E8}" destId="{619D394C-7BE8-4B4A-B466-58591A5D7E8C}" srcOrd="2" destOrd="0" presId="urn:microsoft.com/office/officeart/2005/8/layout/default"/>
+    <dgm:cxn modelId="{4215BACF-EA5B-4289-86DD-2A1DDB717E09}" type="presParOf" srcId="{C71A8E77-E2AB-4BC4-9DC8-CFD5CFBC13E8}" destId="{50B16854-12C6-4FB2-B128-EB9E31BE4F1F}" srcOrd="3" destOrd="0" presId="urn:microsoft.com/office/officeart/2005/8/layout/default"/>
+    <dgm:cxn modelId="{A38DB529-93E7-4FD3-A88B-3C744798FA32}" type="presParOf" srcId="{C71A8E77-E2AB-4BC4-9DC8-CFD5CFBC13E8}" destId="{6E75909A-DD64-400E-8062-DB5DE1EFEEAB}" srcOrd="4" destOrd="0" presId="urn:microsoft.com/office/officeart/2005/8/layout/default"/>
+    <dgm:cxn modelId="{E1BD429D-023A-4140-B785-4C7EE9D2A83D}" type="presParOf" srcId="{C71A8E77-E2AB-4BC4-9DC8-CFD5CFBC13E8}" destId="{35E5F711-7C9C-4BCD-BB91-94E1227A010F}" srcOrd="5" destOrd="0" presId="urn:microsoft.com/office/officeart/2005/8/layout/default"/>
+    <dgm:cxn modelId="{4FB761C5-285C-4BDD-9662-8758767BC0D8}" type="presParOf" srcId="{C71A8E77-E2AB-4BC4-9DC8-CFD5CFBC13E8}" destId="{D7A8DA2B-CFD5-4A8F-8484-9EC1815A5D06}" srcOrd="6" destOrd="0" presId="urn:microsoft.com/office/officeart/2005/8/layout/default"/>
+    <dgm:cxn modelId="{2531E98F-15DB-44D3-9172-42CBA992A7A3}" type="presParOf" srcId="{C71A8E77-E2AB-4BC4-9DC8-CFD5CFBC13E8}" destId="{301B742E-25EE-41A0-98DD-31D38D99E360}" srcOrd="7" destOrd="0" presId="urn:microsoft.com/office/officeart/2005/8/layout/default"/>
+    <dgm:cxn modelId="{32A3C77D-348B-456A-891E-07FF3B532FE1}" type="presParOf" srcId="{C71A8E77-E2AB-4BC4-9DC8-CFD5CFBC13E8}" destId="{B748685B-D4ED-4ECE-88A7-9074F0403905}" srcOrd="8" destOrd="0" presId="urn:microsoft.com/office/officeart/2005/8/layout/default"/>
+    <dgm:cxn modelId="{8F03DA5A-A842-4CF9-96CC-FC53EE519C4E}" type="presParOf" srcId="{C71A8E77-E2AB-4BC4-9DC8-CFD5CFBC13E8}" destId="{8C26BE86-1260-45ED-A57B-4DB8A6563C4B}" srcOrd="9" destOrd="0" presId="urn:microsoft.com/office/officeart/2005/8/layout/default"/>
+    <dgm:cxn modelId="{0C052041-F0E6-49E8-9B54-3E50316FB8BC}" type="presParOf" srcId="{C71A8E77-E2AB-4BC4-9DC8-CFD5CFBC13E8}" destId="{3FCC99D6-4692-4327-A8D6-7B22192D170C}" srcOrd="10" destOrd="0" presId="urn:microsoft.com/office/officeart/2005/8/layout/default"/>
+  </dgm:cxnLst>
+  <dgm:bg/>
+  <dgm:whole/>
+</dgm:dataModel>
+</file>
+
+<file path=ppt/diagrams/layout1.xml><?xml version="1.0" encoding="utf-8"?>
+<dgm:layoutDef xmlns:dgm="http://schemas.openxmlformats.org/drawingml/2006/diagram" xmlns:a="http://schemas.openxmlformats.org/drawingml/2006/main" uniqueId="urn:microsoft.com/office/officeart/2005/8/layout/default">
+  <dgm:title val=""/>
+  <dgm:desc val=""/>
+  <dgm:catLst>
+    <dgm:cat type="list" pri="1000"/>
+  </dgm:catLst>
+  <dgm:sampData>
+    <dgm:dataModel>
+      <dgm:ptLst>
+        <dgm:pt modelId="0" type="doc"/>
+        <dgm:pt modelId="1">
+          <dgm:prSet phldr="1"/>
+        </dgm:pt>
+        <dgm:pt modelId="2">
+          <dgm:prSet phldr="1"/>
+        </dgm:pt>
+        <dgm:pt modelId="3">
+          <dgm:prSet phldr="1"/>
+        </dgm:pt>
+        <dgm:pt modelId="4">
+          <dgm:prSet phldr="1"/>
+        </dgm:pt>
+        <dgm:pt modelId="5">
+          <dgm:prSet phldr="1"/>
+        </dgm:pt>
+      </dgm:ptLst>
+      <dgm:cxnLst>
+        <dgm:cxn modelId="6" srcId="0" destId="1" srcOrd="0" destOrd="0"/>
+        <dgm:cxn modelId="7" srcId="0" destId="2" srcOrd="1" destOrd="0"/>
+        <dgm:cxn modelId="8" srcId="0" destId="3" srcOrd="2" destOrd="0"/>
+        <dgm:cxn modelId="9" srcId="0" destId="4" srcOrd="3" destOrd="0"/>
+        <dgm:cxn modelId="10" srcId="0" destId="5" srcOrd="4" destOrd="0"/>
+      </dgm:cxnLst>
+      <dgm:bg/>
+      <dgm:whole/>
+    </dgm:dataModel>
+  </dgm:sampData>
+  <dgm:styleData>
+    <dgm:dataModel>
+      <dgm:ptLst>
+        <dgm:pt modelId="0" type="doc"/>
+        <dgm:pt modelId="1"/>
+        <dgm:pt modelId="2"/>
+      </dgm:ptLst>
+      <dgm:cxnLst>
+        <dgm:cxn modelId="3" srcId="0" destId="1" srcOrd="0" destOrd="0"/>
+        <dgm:cxn modelId="4" srcId="0" destId="2" srcOrd="1" destOrd="0"/>
+      </dgm:cxnLst>
+      <dgm:bg/>
+      <dgm:whole/>
+    </dgm:dataModel>
+  </dgm:styleData>
+  <dgm:clrData>
+    <dgm:dataModel>
+      <dgm:ptLst>
+        <dgm:pt modelId="0" type="doc"/>
+        <dgm:pt modelId="1"/>
+        <dgm:pt modelId="2"/>
+        <dgm:pt modelId="3"/>
+        <dgm:pt modelId="4"/>
+        <dgm:pt modelId="5"/>
+        <dgm:pt modelId="6"/>
+      </dgm:ptLst>
+      <dgm:cxnLst>
+        <dgm:cxn modelId="7" srcId="0" destId="1" srcOrd="0" destOrd="0"/>
+        <dgm:cxn modelId="8" srcId="0" destId="2" srcOrd="1" destOrd="0"/>
+        <dgm:cxn modelId="9" srcId="0" destId="3" srcOrd="2" destOrd="0"/>
+        <dgm:cxn modelId="10" srcId="0" destId="4" srcOrd="3" destOrd="0"/>
+        <dgm:cxn modelId="11" srcId="0" destId="5" srcOrd="4" destOrd="0"/>
+        <dgm:cxn modelId="12" srcId="0" destId="6" srcOrd="5" destOrd="0"/>
+      </dgm:cxnLst>
+      <dgm:bg/>
+      <dgm:whole/>
+    </dgm:dataModel>
+  </dgm:clrData>
+  <dgm:layoutNode name="diagram">
+    <dgm:varLst>
+      <dgm:dir/>
+      <dgm:resizeHandles val="exact"/>
+    </dgm:varLst>
+    <dgm:choose name="Name0">
+      <dgm:if name="Name1" func="var" arg="dir" op="equ" val="norm">
+        <dgm:alg type="snake">
+          <dgm:param type="grDir" val="tL"/>
+          <dgm:param type="flowDir" val="row"/>
+          <dgm:param type="contDir" val="sameDir"/>
+          <dgm:param type="off" val="ctr"/>
+        </dgm:alg>
+      </dgm:if>
+      <dgm:else name="Name2">
+        <dgm:alg type="snake">
+          <dgm:param type="grDir" val="tR"/>
+          <dgm:param type="flowDir" val="row"/>
+          <dgm:param type="contDir" val="sameDir"/>
+          <dgm:param type="off" val="ctr"/>
+        </dgm:alg>
+      </dgm:else>
+    </dgm:choose>
+    <dgm:shape xmlns:r="http://schemas.openxmlformats.org/officeDocument/2006/relationships" r:blip="">
+      <dgm:adjLst/>
+    </dgm:shape>
+    <dgm:presOf/>
+    <dgm:constrLst>
+      <dgm:constr type="w" for="ch" forName="node" refType="w"/>
+      <dgm:constr type="h" for="ch" forName="node" refType="w" refFor="ch" refForName="node" fact="0.6"/>
+      <dgm:constr type="w" for="ch" forName="sibTrans" refType="w" refFor="ch" refForName="node" fact="0.1"/>
+      <dgm:constr type="sp" refType="w" refFor="ch" refForName="sibTrans"/>
+      <dgm:constr type="primFontSz" for="ch" forName="node" op="equ" val="65"/>
+    </dgm:constrLst>
+    <dgm:ruleLst/>
+    <dgm:forEach name="Name3" axis="ch" ptType="node">
+      <dgm:layoutNode name="node">
+        <dgm:varLst>
+          <dgm:bulletEnabled val="1"/>
+        </dgm:varLst>
+        <dgm:alg type="tx"/>
+        <dgm:shape xmlns:r="http://schemas.openxmlformats.org/officeDocument/2006/relationships" type="rect" r:blip="">
+          <dgm:adjLst/>
+        </dgm:shape>
+        <dgm:presOf axis="desOrSelf" ptType="node"/>
+        <dgm:constrLst>
+          <dgm:constr type="lMarg" refType="primFontSz" fact="0.3"/>
+          <dgm:constr type="rMarg" refType="primFontSz" fact="0.3"/>
+          <dgm:constr type="tMarg" refType="primFontSz" fact="0.3"/>
+          <dgm:constr type="bMarg" refType="primFontSz" fact="0.3"/>
+        </dgm:constrLst>
+        <dgm:ruleLst>
+          <dgm:rule type="primFontSz" val="5" fact="NaN" max="NaN"/>
+        </dgm:ruleLst>
+      </dgm:layoutNode>
+      <dgm:forEach name="Name4" axis="followSib" ptType="sibTrans" cnt="1">
+        <dgm:layoutNode name="sibTrans">
+          <dgm:alg type="sp"/>
+          <dgm:shape xmlns:r="http://schemas.openxmlformats.org/officeDocument/2006/relationships" r:blip="">
+            <dgm:adjLst/>
+          </dgm:shape>
+          <dgm:presOf/>
+          <dgm:constrLst/>
+          <dgm:ruleLst/>
+        </dgm:layoutNode>
+      </dgm:forEach>
+    </dgm:forEach>
+  </dgm:layoutNode>
+</dgm:layoutDef>
+</file>
+
+<file path=ppt/diagrams/quickStyle1.xml><?xml version="1.0" encoding="utf-8"?>
+<dgm:styleDef xmlns:dgm="http://schemas.openxmlformats.org/drawingml/2006/diagram" xmlns:a="http://schemas.openxmlformats.org/drawingml/2006/main" uniqueId="urn:microsoft.com/office/officeart/2005/8/quickstyle/simple1">
+  <dgm:title val=""/>
+  <dgm:desc val=""/>
+  <dgm:catLst>
+    <dgm:cat type="simple" pri="10100"/>
+  </dgm:catLst>
+  <dgm:scene3d>
+    <a:camera prst="orthographicFront"/>
+    <a:lightRig rig="threePt" dir="t"/>
+  </dgm:scene3d>
+  <dgm:styleLbl name="node0">
+    <dgm:scene3d>
+      <a:camera prst="orthographicFront"/>
+      <a:lightRig rig="threePt" dir="t"/>
+    </dgm:scene3d>
+    <dgm:sp3d/>
+    <dgm:txPr/>
+    <dgm:style>
+      <a:lnRef idx="2">
+        <a:scrgbClr r="0" g="0" b="0"/>
+      </a:lnRef>
+      <a:fillRef idx="1">
+        <a:scrgbClr r="0" g="0" b="0"/>
+      </a:fillRef>
+      <a:effectRef idx="0">
+        <a:scrgbClr r="0" g="0" b="0"/>
+      </a:effectRef>
+      <a:fontRef idx="minor">
+        <a:schemeClr val="lt1"/>
+      </a:fontRef>
+    </dgm:style>
+  </dgm:styleLbl>
+  <dgm:styleLbl name="lnNode1">
+    <dgm:scene3d>
+      <a:camera prst="orthographicFront"/>
+      <a:lightRig rig="threePt" dir="t"/>
+    </dgm:scene3d>
+    <dgm:sp3d/>
+    <dgm:txPr/>
+    <dgm:style>
+      <a:lnRef idx="2">
+        <a:scrgbClr r="0" g="0" b="0"/>
+      </a:lnRef>
+      <a:fillRef idx="1">
+        <a:scrgbClr r="0" g="0" b="0"/>
+      </a:fillRef>
+      <a:effectRef idx="0">
+        <a:scrgbClr r="0" g="0" b="0"/>
+      </a:effectRef>
+      <a:fontRef idx="minor">
+        <a:schemeClr val="lt1"/>
+      </a:fontRef>
+    </dgm:style>
+  </dgm:styleLbl>
+  <dgm:styleLbl name="vennNode1">
+    <dgm:scene3d>
+      <a:camera prst="orthographicFront"/>
+      <a:lightRig rig="threePt" dir="t"/>
+    </dgm:scene3d>
+    <dgm:sp3d/>
+    <dgm:txPr/>
+    <dgm:style>
+      <a:lnRef idx="2">
+        <a:scrgbClr r="0" g="0" b="0"/>
+      </a:lnRef>
+      <a:fillRef idx="1">
+        <a:scrgbClr r="0" g="0" b="0"/>
+      </a:fillRef>
+      <a:effectRef idx="0">
+        <a:scrgbClr r="0" g="0" b="0"/>
+      </a:effectRef>
+      <a:fontRef idx="minor">
+        <a:schemeClr val="tx1"/>
+      </a:fontRef>
+    </dgm:style>
+  </dgm:styleLbl>
+  <dgm:styleLbl name="alignNode1">
+    <dgm:scene3d>
+      <a:camera prst="orthographicFront"/>
+      <a:lightRig rig="threePt" dir="t"/>
+    </dgm:scene3d>
+    <dgm:sp3d/>
+    <dgm:txPr/>
+    <dgm:style>
+      <a:lnRef idx="2">
+        <a:scrgbClr r="0" g="0" b="0"/>
+      </a:lnRef>
+      <a:fillRef idx="1">
+        <a:scrgbClr r="0" g="0" b="0"/>
+      </a:fillRef>
+      <a:effectRef idx="0">
+        <a:scrgbClr r="0" g="0" b="0"/>
+      </a:effectRef>
+      <a:fontRef idx="minor">
+        <a:schemeClr val="lt1"/>
+      </a:fontRef>
+    </dgm:style>
+  </dgm:styleLbl>
+  <dgm:styleLbl name="node1">
+    <dgm:scene3d>
+      <a:camera prst="orthographicFront"/>
+      <a:lightRig rig="threePt" dir="t"/>
+    </dgm:scene3d>
+    <dgm:sp3d/>
+    <dgm:txPr/>
+    <dgm:style>
+      <a:lnRef idx="2">
+        <a:scrgbClr r="0" g="0" b="0"/>
+      </a:lnRef>
+      <a:fillRef idx="1">
+        <a:scrgbClr r="0" g="0" b="0"/>
+      </a:fillRef>
+      <a:effectRef idx="0">
+        <a:scrgbClr r="0" g="0" b="0"/>
+      </a:effectRef>
+      <a:fontRef idx="minor">
+        <a:schemeClr val="lt1"/>
+      </a:fontRef>
+    </dgm:style>
+  </dgm:styleLbl>
+  <dgm:styleLbl name="node2">
+    <dgm:scene3d>
+      <a:camera prst="orthographicFront"/>
+      <a:lightRig rig="threePt" dir="t"/>
+    </dgm:scene3d>
+    <dgm:sp3d/>
+    <dgm:txPr/>
+    <dgm:style>
+      <a:lnRef idx="2">
+        <a:scrgbClr r="0" g="0" b="0"/>
+      </a:lnRef>
+      <a:fillRef idx="1">
+        <a:scrgbClr r="0" g="0" b="0"/>
+      </a:fillRef>
+      <a:effectRef idx="0">
+        <a:scrgbClr r="0" g="0" b="0"/>
+      </a:effectRef>
+      <a:fontRef idx="minor">
+        <a:schemeClr val="lt1"/>
+      </a:fontRef>
+    </dgm:style>
+  </dgm:styleLbl>
+  <dgm:styleLbl name="node3">
+    <dgm:scene3d>
+      <a:camera prst="orthographicFront"/>
+      <a:lightRig rig="threePt" dir="t"/>
+    </dgm:scene3d>
+    <dgm:sp3d/>
+    <dgm:txPr/>
+    <dgm:style>
+      <a:lnRef idx="2">
+        <a:scrgbClr r="0" g="0" b="0"/>
+      </a:lnRef>
+      <a:fillRef idx="1">
+        <a:scrgbClr r="0" g="0" b="0"/>
+      </a:fillRef>
+      <a:effectRef idx="0">
+        <a:scrgbClr r="0" g="0" b="0"/>
+      </a:effectRef>
+      <a:fontRef idx="minor">
+        <a:schemeClr val="lt1"/>
+      </a:fontRef>
+    </dgm:style>
+  </dgm:styleLbl>
+  <dgm:styleLbl name="node4">
+    <dgm:scene3d>
+      <a:camera prst="orthographicFront"/>
+      <a:lightRig rig="threePt" dir="t"/>
+    </dgm:scene3d>
+    <dgm:sp3d/>
+    <dgm:txPr/>
+    <dgm:style>
+      <a:lnRef idx="2">
+        <a:scrgbClr r="0" g="0" b="0"/>
+      </a:lnRef>
+      <a:fillRef idx="1">
+        <a:scrgbClr r="0" g="0" b="0"/>
+      </a:fillRef>
+      <a:effectRef idx="0">
+        <a:scrgbClr r="0" g="0" b="0"/>
+      </a:effectRef>
+      <a:fontRef idx="minor">
+        <a:schemeClr val="lt1"/>
+      </a:fontRef>
+    </dgm:style>
+  </dgm:styleLbl>
+  <dgm:styleLbl name="fgImgPlace1">
+    <dgm:scene3d>
+      <a:camera prst="orthographicFront"/>
+      <a:lightRig rig="threePt" dir="t"/>
+    </dgm:scene3d>
+    <dgm:sp3d/>
+    <dgm:txPr/>
+    <dgm:style>
+      <a:lnRef idx="2">
+        <a:scrgbClr r="0" g="0" b="0"/>
+      </a:lnRef>
+      <a:fillRef idx="1">
+        <a:scrgbClr r="0" g="0" b="0"/>
+      </a:fillRef>
+      <a:effectRef idx="0">
+        <a:scrgbClr r="0" g="0" b="0"/>
+      </a:effectRef>
+      <a:fontRef idx="minor"/>
+    </dgm:style>
+  </dgm:styleLbl>
+  <dgm:styleLbl name="alignImgPlace1">
+    <dgm:scene3d>
+      <a:camera prst="orthographicFront"/>
+      <a:lightRig rig="threePt" dir="t"/>
+    </dgm:scene3d>
+    <dgm:sp3d/>
+    <dgm:txPr/>
+    <dgm:style>
+      <a:lnRef idx="2">
+        <a:scrgbClr r="0" g="0" b="0"/>
+      </a:lnRef>
+      <a:fillRef idx="1">
+        <a:scrgbClr r="0" g="0" b="0"/>
+      </a:fillRef>
+      <a:effectRef idx="0">
+        <a:scrgbClr r="0" g="0" b="0"/>
+      </a:effectRef>
+      <a:fontRef idx="minor"/>
+    </dgm:style>
+  </dgm:styleLbl>
+  <dgm:styleLbl name="bgImgPlace1">
+    <dgm:scene3d>
+      <a:camera prst="orthographicFront"/>
+      <a:lightRig rig="threePt" dir="t"/>
+    </dgm:scene3d>
+    <dgm:sp3d/>
+    <dgm:txPr/>
+    <dgm:style>
+      <a:lnRef idx="2">
+        <a:scrgbClr r="0" g="0" b="0"/>
+      </a:lnRef>
+      <a:fillRef idx="1">
+        <a:scrgbClr r="0" g="0" b="0"/>
+      </a:fillRef>
+      <a:effectRef idx="0">
+        <a:scrgbClr r="0" g="0" b="0"/>
+      </a:effectRef>
+      <a:fontRef idx="minor"/>
+    </dgm:style>
+  </dgm:styleLbl>
+  <dgm:styleLbl name="sibTrans2D1">
+    <dgm:scene3d>
+      <a:camera prst="orthographicFront"/>
+      <a:lightRig rig="threePt" dir="t"/>
+    </dgm:scene3d>
+    <dgm:sp3d/>
+    <dgm:txPr/>
+    <dgm:style>
+      <a:lnRef idx="0">
+        <a:scrgbClr r="0" g="0" b="0"/>
+      </a:lnRef>
+      <a:fillRef idx="1">
+        <a:scrgbClr r="0" g="0" b="0"/>
+      </a:fillRef>
+      <a:effectRef idx="0">
+        <a:scrgbClr r="0" g="0" b="0"/>
+      </a:effectRef>
+      <a:fontRef idx="minor">
+        <a:schemeClr val="lt1"/>
+      </a:fontRef>
+    </dgm:style>
+  </dgm:styleLbl>
+  <dgm:styleLbl name="fgSibTrans2D1">
+    <dgm:scene3d>
+      <a:camera prst="orthographicFront"/>
+      <a:lightRig rig="threePt" dir="t"/>
+    </dgm:scene3d>
+    <dgm:sp3d/>
+    <dgm:txPr/>
+    <dgm:style>
+      <a:lnRef idx="0">
+        <a:scrgbClr r="0" g="0" b="0"/>
+      </a:lnRef>
+      <a:fillRef idx="1">
+        <a:scrgbClr r="0" g="0" b="0"/>
+      </a:fillRef>
+      <a:effectRef idx="0">
+        <a:scrgbClr r="0" g="0" b="0"/>
+      </a:effectRef>
+      <a:fontRef idx="minor">
+        <a:schemeClr val="lt1"/>
+      </a:fontRef>
+    </dgm:style>
+  </dgm:styleLbl>
+  <dgm:styleLbl name="bgSibTrans2D1">
+    <dgm:scene3d>
+      <a:camera prst="orthographicFront"/>
+      <a:lightRig rig="threePt" dir="t"/>
+    </dgm:scene3d>
+    <dgm:sp3d/>
+    <dgm:txPr/>
+    <dgm:style>
+      <a:lnRef idx="0">
+        <a:scrgbClr r="0" g="0" b="0"/>
+      </a:lnRef>
+      <a:fillRef idx="1">
+        <a:scrgbClr r="0" g="0" b="0"/>
+      </a:fillRef>
+      <a:effectRef idx="0">
+        <a:scrgbClr r="0" g="0" b="0"/>
+      </a:effectRef>
+      <a:fontRef idx="minor">
+        <a:schemeClr val="lt1"/>
+      </a:fontRef>
+    </dgm:style>
+  </dgm:styleLbl>
+  <dgm:styleLbl name="sibTrans1D1">
+    <dgm:scene3d>
+      <a:camera prst="orthographicFront"/>
+      <a:lightRig rig="threePt" dir="t"/>
+    </dgm:scene3d>
+    <dgm:sp3d/>
+    <dgm:txPr/>
+    <dgm:style>
+      <a:lnRef idx="1">
+        <a:scrgbClr r="0" g="0" b="0"/>
+      </a:lnRef>
+      <a:fillRef idx="0">
+        <a:scrgbClr r="0" g="0" b="0"/>
+      </a:fillRef>
+      <a:effectRef idx="0">
+        <a:scrgbClr r="0" g="0" b="0"/>
+      </a:effectRef>
+      <a:fontRef idx="minor"/>
+    </dgm:style>
+  </dgm:styleLbl>
+  <dgm:styleLbl name="callout">
+    <dgm:scene3d>
+      <a:camera prst="orthographicFront"/>
+      <a:lightRig rig="threePt" dir="t"/>
+    </dgm:scene3d>
+    <dgm:sp3d/>
+    <dgm:txPr/>
+    <dgm:style>
+      <a:lnRef idx="2">
+        <a:scrgbClr r="0" g="0" b="0"/>
+      </a:lnRef>
+      <a:fillRef idx="1">
+        <a:scrgbClr r="0" g="0" b="0"/>
+      </a:fillRef>
+      <a:effectRef idx="0">
+        <a:scrgbClr r="0" g="0" b="0"/>
+      </a:effectRef>
+      <a:fontRef idx="minor"/>
+    </dgm:style>
+  </dgm:styleLbl>
+  <dgm:styleLbl name="asst0">
+    <dgm:scene3d>
+      <a:camera prst="orthographicFront"/>
+      <a:lightRig rig="threePt" dir="t"/>
+    </dgm:scene3d>
+    <dgm:sp3d/>
+    <dgm:txPr/>
+    <dgm:style>
+      <a:lnRef idx="2">
+        <a:scrgbClr r="0" g="0" b="0"/>
+      </a:lnRef>
+      <a:fillRef idx="1">
+        <a:scrgbClr r="0" g="0" b="0"/>
+      </a:fillRef>
+      <a:effectRef idx="0">
+        <a:scrgbClr r="0" g="0" b="0"/>
+      </a:effectRef>
+      <a:fontRef idx="minor">
+        <a:schemeClr val="lt1"/>
+      </a:fontRef>
+    </dgm:style>
+  </dgm:styleLbl>
+  <dgm:styleLbl name="asst1">
+    <dgm:scene3d>
+      <a:camera prst="orthographicFront"/>
+      <a:lightRig rig="threePt" dir="t"/>
+    </dgm:scene3d>
+    <dgm:sp3d/>
+    <dgm:txPr/>
+    <dgm:style>
+      <a:lnRef idx="2">
+        <a:scrgbClr r="0" g="0" b="0"/>
+      </a:lnRef>
+      <a:fillRef idx="1">
+        <a:scrgbClr r="0" g="0" b="0"/>
+      </a:fillRef>
+      <a:effectRef idx="0">
+        <a:scrgbClr r="0" g="0" b="0"/>
+      </a:effectRef>
+      <a:fontRef idx="minor">
+        <a:schemeClr val="lt1"/>
+      </a:fontRef>
+    </dgm:style>
+  </dgm:styleLbl>
+  <dgm:styleLbl name="asst2">
+    <dgm:scene3d>
+      <a:camera prst="orthographicFront"/>
+      <a:lightRig rig="threePt" dir="t"/>
+    </dgm:scene3d>
+    <dgm:sp3d/>
+    <dgm:txPr/>
+    <dgm:style>
+      <a:lnRef idx="2">
+        <a:scrgbClr r="0" g="0" b="0"/>
+      </a:lnRef>
+      <a:fillRef idx="1">
+        <a:scrgbClr r="0" g="0" b="0"/>
+      </a:fillRef>
+      <a:effectRef idx="0">
+        <a:scrgbClr r="0" g="0" b="0"/>
+      </a:effectRef>
+      <a:fontRef idx="minor">
+        <a:schemeClr val="lt1"/>
+      </a:fontRef>
+    </dgm:style>
+  </dgm:styleLbl>
+  <dgm:styleLbl name="asst3">
+    <dgm:scene3d>
+      <a:camera prst="orthographicFront"/>
+      <a:lightRig rig="threePt" dir="t"/>
+    </dgm:scene3d>
+    <dgm:sp3d/>
+    <dgm:txPr/>
+    <dgm:style>
+      <a:lnRef idx="2">
+        <a:scrgbClr r="0" g="0" b="0"/>
+      </a:lnRef>
+      <a:fillRef idx="1">
+        <a:scrgbClr r="0" g="0" b="0"/>
+      </a:fillRef>
+      <a:effectRef idx="0">
+        <a:scrgbClr r="0" g="0" b="0"/>
+      </a:effectRef>
+      <a:fontRef idx="minor">
+        <a:schemeClr val="lt1"/>
+      </a:fontRef>
+    </dgm:style>
+  </dgm:styleLbl>
+  <dgm:styleLbl name="asst4">
+    <dgm:scene3d>
+      <a:camera prst="orthographicFront"/>
+      <a:lightRig rig="threePt" dir="t"/>
+    </dgm:scene3d>
+    <dgm:sp3d/>
+    <dgm:txPr/>
+    <dgm:style>
+      <a:lnRef idx="2">
+        <a:scrgbClr r="0" g="0" b="0"/>
+      </a:lnRef>
+      <a:fillRef idx="1">
+        <a:scrgbClr r="0" g="0" b="0"/>
+      </a:fillRef>
+      <a:effectRef idx="0">
+        <a:scrgbClr r="0" g="0" b="0"/>
+      </a:effectRef>
+      <a:fontRef idx="minor">
+        <a:schemeClr val="lt1"/>
+      </a:fontRef>
+    </dgm:style>
+  </dgm:styleLbl>
+  <dgm:styleLbl name="parChTrans2D1">
+    <dgm:scene3d>
+      <a:camera prst="orthographicFront"/>
+      <a:lightRig rig="threePt" dir="t"/>
+    </dgm:scene3d>
+    <dgm:sp3d/>
+    <dgm:txPr/>
+    <dgm:style>
+      <a:lnRef idx="2">
+        <a:scrgbClr r="0" g="0" b="0"/>
+      </a:lnRef>
+      <a:fillRef idx="1">
+        <a:scrgbClr r="0" g="0" b="0"/>
+      </a:fillRef>
+      <a:effectRef idx="0">
+        <a:scrgbClr r="0" g="0" b="0"/>
+      </a:effectRef>
+      <a:fontRef idx="minor">
+        <a:schemeClr val="lt1"/>
+      </a:fontRef>
+    </dgm:style>
+  </dgm:styleLbl>
+  <dgm:styleLbl name="parChTrans2D2">
+    <dgm:scene3d>
+      <a:camera prst="orthographicFront"/>
+      <a:lightRig rig="threePt" dir="t"/>
+    </dgm:scene3d>
+    <dgm:sp3d/>
+    <dgm:txPr/>
+    <dgm:style>
+      <a:lnRef idx="2">
+        <a:scrgbClr r="0" g="0" b="0"/>
+      </a:lnRef>
+      <a:fillRef idx="1">
+        <a:scrgbClr r="0" g="0" b="0"/>
+      </a:fillRef>
+      <a:effectRef idx="0">
+        <a:scrgbClr r="0" g="0" b="0"/>
+      </a:effectRef>
+      <a:fontRef idx="minor">
+        <a:schemeClr val="lt1"/>
+      </a:fontRef>
+    </dgm:style>
+  </dgm:styleLbl>
+  <dgm:styleLbl name="parChTrans2D3">
+    <dgm:scene3d>
+      <a:camera prst="orthographicFront"/>
+      <a:lightRig rig="threePt" dir="t"/>
+    </dgm:scene3d>
+    <dgm:sp3d/>
+    <dgm:txPr/>
+    <dgm:style>
+      <a:lnRef idx="2">
+        <a:scrgbClr r="0" g="0" b="0"/>
+      </a:lnRef>
+      <a:fillRef idx="1">
+        <a:scrgbClr r="0" g="0" b="0"/>
+      </a:fillRef>
+      <a:effectRef idx="0">
+        <a:scrgbClr r="0" g="0" b="0"/>
+      </a:effectRef>
+      <a:fontRef idx="minor">
+        <a:schemeClr val="lt1"/>
+      </a:fontRef>
+    </dgm:style>
+  </dgm:styleLbl>
+  <dgm:styleLbl name="parChTrans2D4">
+    <dgm:scene3d>
+      <a:camera prst="orthographicFront"/>
+      <a:lightRig rig="threePt" dir="t"/>
+    </dgm:scene3d>
+    <dgm:sp3d/>
+    <dgm:txPr/>
+    <dgm:style>
+      <a:lnRef idx="2">
+        <a:scrgbClr r="0" g="0" b="0"/>
+      </a:lnRef>
+      <a:fillRef idx="1">
+        <a:scrgbClr r="0" g="0" b="0"/>
+      </a:fillRef>
+      <a:effectRef idx="0">
+        <a:scrgbClr r="0" g="0" b="0"/>
+      </a:effectRef>
+      <a:fontRef idx="minor">
+        <a:schemeClr val="lt1"/>
+      </a:fontRef>
+    </dgm:style>
+  </dgm:styleLbl>
+  <dgm:styleLbl name="parChTrans1D1">
+    <dgm:scene3d>
+      <a:camera prst="orthographicFront"/>
+      <a:lightRig rig="threePt" dir="t"/>
+    </dgm:scene3d>
+    <dgm:sp3d/>
+    <dgm:txPr/>
+    <dgm:style>
+      <a:lnRef idx="2">
+        <a:scrgbClr r="0" g="0" b="0"/>
+      </a:lnRef>
+      <a:fillRef idx="0">
+        <a:scrgbClr r="0" g="0" b="0"/>
+      </a:fillRef>
+      <a:effectRef idx="0">
+        <a:scrgbClr r="0" g="0" b="0"/>
+      </a:effectRef>
+      <a:fontRef idx="minor"/>
+    </dgm:style>
+  </dgm:styleLbl>
+  <dgm:styleLbl name="parChTrans1D2">
+    <dgm:scene3d>
+      <a:camera prst="orthographicFront"/>
+      <a:lightRig rig="threePt" dir="t"/>
+    </dgm:scene3d>
+    <dgm:sp3d/>
+    <dgm:txPr/>
+    <dgm:style>
+      <a:lnRef idx="2">
+        <a:scrgbClr r="0" g="0" b="0"/>
+      </a:lnRef>
+      <a:fillRef idx="0">
+        <a:scrgbClr r="0" g="0" b="0"/>
+      </a:fillRef>
+      <a:effectRef idx="0">
+        <a:scrgbClr r="0" g="0" b="0"/>
+      </a:effectRef>
+      <a:fontRef idx="minor"/>
+    </dgm:style>
+  </dgm:styleLbl>
+  <dgm:styleLbl name="parChTrans1D3">
+    <dgm:scene3d>
+      <a:camera prst="orthographicFront"/>
+      <a:lightRig rig="threePt" dir="t"/>
+    </dgm:scene3d>
+    <dgm:sp3d/>
+    <dgm:txPr/>
+    <dgm:style>
+      <a:lnRef idx="2">
+        <a:scrgbClr r="0" g="0" b="0"/>
+      </a:lnRef>
+      <a:fillRef idx="0">
+        <a:scrgbClr r="0" g="0" b="0"/>
+      </a:fillRef>
+      <a:effectRef idx="0">
+        <a:scrgbClr r="0" g="0" b="0"/>
+      </a:effectRef>
+      <a:fontRef idx="minor"/>
+    </dgm:style>
+  </dgm:styleLbl>
+  <dgm:styleLbl name="parChTrans1D4">
+    <dgm:scene3d>
+      <a:camera prst="orthographicFront"/>
+      <a:lightRig rig="threePt" dir="t"/>
+    </dgm:scene3d>
+    <dgm:sp3d/>
+    <dgm:txPr/>
+    <dgm:style>
+      <a:lnRef idx="2">
+        <a:scrgbClr r="0" g="0" b="0"/>
+      </a:lnRef>
+      <a:fillRef idx="0">
+        <a:scrgbClr r="0" g="0" b="0"/>
+      </a:fillRef>
+      <a:effectRef idx="0">
+        <a:scrgbClr r="0" g="0" b="0"/>
+      </a:effectRef>
+      <a:fontRef idx="minor"/>
+    </dgm:style>
+  </dgm:styleLbl>
+  <dgm:styleLbl name="fgAcc1">
+    <dgm:scene3d>
+      <a:camera prst="orthographicFront"/>
+      <a:lightRig rig="threePt" dir="t"/>
+    </dgm:scene3d>
+    <dgm:sp3d/>
+    <dgm:txPr/>
+    <dgm:style>
+      <a:lnRef idx="2">
+        <a:scrgbClr r="0" g="0" b="0"/>
+      </a:lnRef>
+      <a:fillRef idx="1">
+        <a:scrgbClr r="0" g="0" b="0"/>
+      </a:fillRef>
+      <a:effectRef idx="0">
+        <a:scrgbClr r="0" g="0" b="0"/>
+      </a:effectRef>
+      <a:fontRef idx="minor"/>
+    </dgm:style>
+  </dgm:styleLbl>
+  <dgm:styleLbl name="conFgAcc1">
+    <dgm:scene3d>
+      <a:camera prst="orthographicFront"/>
+      <a:lightRig rig="threePt" dir="t"/>
+    </dgm:scene3d>
+    <dgm:sp3d/>
+    <dgm:txPr/>
+    <dgm:style>
+      <a:lnRef idx="2">
+        <a:scrgbClr r="0" g="0" b="0"/>
+      </a:lnRef>
+      <a:fillRef idx="1">
+        <a:scrgbClr r="0" g="0" b="0"/>
+      </a:fillRef>
+      <a:effectRef idx="0">
+        <a:scrgbClr r="0" g="0" b="0"/>
+      </a:effectRef>
+      <a:fontRef idx="minor"/>
+    </dgm:style>
+  </dgm:styleLbl>
+  <dgm:styleLbl name="alignAcc1">
+    <dgm:scene3d>
+      <a:camera prst="orthographicFront"/>
+      <a:lightRig rig="threePt" dir="t"/>
+    </dgm:scene3d>
+    <dgm:sp3d/>
+    <dgm:txPr/>
+    <dgm:style>
+      <a:lnRef idx="2">
+        <a:scrgbClr r="0" g="0" b="0"/>
+      </a:lnRef>
+      <a:fillRef idx="1">
+        <a:scrgbClr r="0" g="0" b="0"/>
+      </a:fillRef>
+      <a:effectRef idx="0">
+        <a:scrgbClr r="0" g="0" b="0"/>
+      </a:effectRef>
+      <a:fontRef idx="minor"/>
+    </dgm:style>
+  </dgm:styleLbl>
+  <dgm:styleLbl name="trAlignAcc1">
+    <dgm:scene3d>
+      <a:camera prst="orthographicFront"/>
+      <a:lightRig rig="threePt" dir="t"/>
+    </dgm:scene3d>
+    <dgm:sp3d/>
+    <dgm:txPr/>
+    <dgm:style>
+      <a:lnRef idx="1">
+        <a:scrgbClr r="0" g="0" b="0"/>
+      </a:lnRef>
+      <a:fillRef idx="1">
+        <a:scrgbClr r="0" g="0" b="0"/>
+      </a:fillRef>
+      <a:effectRef idx="0">
+        <a:scrgbClr r="0" g="0" b="0"/>
+      </a:effectRef>
+      <a:fontRef idx="minor"/>
+    </dgm:style>
+  </dgm:styleLbl>
+  <dgm:styleLbl name="bgAcc1">
+    <dgm:scene3d>
+      <a:camera prst="orthographicFront"/>
+      <a:lightRig rig="threePt" dir="t"/>
+    </dgm:scene3d>
+    <dgm:sp3d/>
+    <dgm:txPr/>
+    <dgm:style>
+      <a:lnRef idx="2">
+        <a:scrgbClr r="0" g="0" b="0"/>
+      </a:lnRef>
+      <a:fillRef idx="1">
+        <a:scrgbClr r="0" g="0" b="0"/>
+      </a:fillRef>
+      <a:effectRef idx="0">
+        <a:scrgbClr r="0" g="0" b="0"/>
+      </a:effectRef>
+      <a:fontRef idx="minor"/>
+    </dgm:style>
+  </dgm:styleLbl>
+  <dgm:styleLbl name="solidFgAcc1">
+    <dgm:scene3d>
+      <a:camera prst="orthographicFront"/>
+      <a:lightRig rig="threePt" dir="t"/>
+    </dgm:scene3d>
+    <dgm:sp3d/>
+    <dgm:txPr/>
+    <dgm:style>
+      <a:lnRef idx="2">
+        <a:scrgbClr r="0" g="0" b="0"/>
+      </a:lnRef>
+      <a:fillRef idx="1">
+        <a:scrgbClr r="0" g="0" b="0"/>
+      </a:fillRef>
+      <a:effectRef idx="0">
+        <a:scrgbClr r="0" g="0" b="0"/>
+      </a:effectRef>
+      <a:fontRef idx="minor"/>
+    </dgm:style>
+  </dgm:styleLbl>
+  <dgm:styleLbl name="solidAlignAcc1">
+    <dgm:scene3d>
+      <a:camera prst="orthographicFront"/>
+      <a:lightRig rig="threePt" dir="t"/>
+    </dgm:scene3d>
+    <dgm:sp3d/>
+    <dgm:txPr/>
+    <dgm:style>
+      <a:lnRef idx="2">
+        <a:scrgbClr r="0" g="0" b="0"/>
+      </a:lnRef>
+      <a:fillRef idx="1">
+        <a:scrgbClr r="0" g="0" b="0"/>
+      </a:fillRef>
+      <a:effectRef idx="0">
+        <a:scrgbClr r="0" g="0" b="0"/>
+      </a:effectRef>
+      <a:fontRef idx="minor"/>
+    </dgm:style>
+  </dgm:styleLbl>
+  <dgm:styleLbl name="solidBgAcc1">
+    <dgm:scene3d>
+      <a:camera prst="orthographicFront"/>
+      <a:lightRig rig="threePt" dir="t"/>
+    </dgm:scene3d>
+    <dgm:sp3d/>
+    <dgm:txPr/>
+    <dgm:style>
+      <a:lnRef idx="2">
+        <a:scrgbClr r="0" g="0" b="0"/>
+      </a:lnRef>
+      <a:fillRef idx="1">
+        <a:scrgbClr r="0" g="0" b="0"/>
+      </a:fillRef>
+      <a:effectRef idx="0">
+        <a:scrgbClr r="0" g="0" b="0"/>
+      </a:effectRef>
+      <a:fontRef idx="minor"/>
+    </dgm:style>
+  </dgm:styleLbl>
+  <dgm:styleLbl name="fgAccFollowNode1">
+    <dgm:scene3d>
+      <a:camera prst="orthographicFront"/>
+      <a:lightRig rig="threePt" dir="t"/>
+    </dgm:scene3d>
+    <dgm:sp3d/>
+    <dgm:txPr/>
+    <dgm:style>
+      <a:lnRef idx="2">
+        <a:scrgbClr r="0" g="0" b="0"/>
+      </a:lnRef>
+      <a:fillRef idx="1">
+        <a:scrgbClr r="0" g="0" b="0"/>
+      </a:fillRef>
+      <a:effectRef idx="0">
+        <a:scrgbClr r="0" g="0" b="0"/>
+      </a:effectRef>
+      <a:fontRef idx="minor"/>
+    </dgm:style>
+  </dgm:styleLbl>
+  <dgm:styleLbl name="alignAccFollowNode1">
+    <dgm:scene3d>
+      <a:camera prst="orthographicFront"/>
+      <a:lightRig rig="threePt" dir="t"/>
+    </dgm:scene3d>
+    <dgm:sp3d/>
+    <dgm:txPr/>
+    <dgm:style>
+      <a:lnRef idx="2">
+        <a:scrgbClr r="0" g="0" b="0"/>
+      </a:lnRef>
+      <a:fillRef idx="1">
+        <a:scrgbClr r="0" g="0" b="0"/>
+      </a:fillRef>
+      <a:effectRef idx="0">
+        <a:scrgbClr r="0" g="0" b="0"/>
+      </a:effectRef>
+      <a:fontRef idx="minor"/>
+    </dgm:style>
+  </dgm:styleLbl>
+  <dgm:styleLbl name="bgAccFollowNode1">
+    <dgm:scene3d>
+      <a:camera prst="orthographicFront"/>
+      <a:lightRig rig="threePt" dir="t"/>
+    </dgm:scene3d>
+    <dgm:sp3d/>
+    <dgm:txPr/>
+    <dgm:style>
+      <a:lnRef idx="2">
+        <a:scrgbClr r="0" g="0" b="0"/>
+      </a:lnRef>
+      <a:fillRef idx="1">
+        <a:scrgbClr r="0" g="0" b="0"/>
+      </a:fillRef>
+      <a:effectRef idx="0">
+        <a:scrgbClr r="0" g="0" b="0"/>
+      </a:effectRef>
+      <a:fontRef idx="minor"/>
+    </dgm:style>
+  </dgm:styleLbl>
+  <dgm:styleLbl name="fgAcc0">
+    <dgm:scene3d>
+      <a:camera prst="orthographicFront"/>
+      <a:lightRig rig="threePt" dir="t"/>
+    </dgm:scene3d>
+    <dgm:sp3d/>
+    <dgm:txPr/>
+    <dgm:style>
+      <a:lnRef idx="2">
+        <a:scrgbClr r="0" g="0" b="0"/>
+      </a:lnRef>
+      <a:fillRef idx="1">
+        <a:scrgbClr r="0" g="0" b="0"/>
+      </a:fillRef>
+      <a:effectRef idx="0">
+        <a:scrgbClr r="0" g="0" b="0"/>
+      </a:effectRef>
+      <a:fontRef idx="minor"/>
+    </dgm:style>
+  </dgm:styleLbl>
+  <dgm:styleLbl name="fgAcc2">
+    <dgm:scene3d>
+      <a:camera prst="orthographicFront"/>
+      <a:lightRig rig="threePt" dir="t"/>
+    </dgm:scene3d>
+    <dgm:sp3d/>
+    <dgm:txPr/>
+    <dgm:style>
+      <a:lnRef idx="2">
+        <a:scrgbClr r="0" g="0" b="0"/>
+      </a:lnRef>
+      <a:fillRef idx="1">
+        <a:scrgbClr r="0" g="0" b="0"/>
+      </a:fillRef>
+      <a:effectRef idx="0">
+        <a:scrgbClr r="0" g="0" b="0"/>
+      </a:effectRef>
+      <a:fontRef idx="minor"/>
+    </dgm:style>
+  </dgm:styleLbl>
+  <dgm:styleLbl name="fgAcc3">
+    <dgm:scene3d>
+      <a:camera prst="orthographicFront"/>
+      <a:lightRig rig="threePt" dir="t"/>
+    </dgm:scene3d>
+    <dgm:sp3d/>
+    <dgm:txPr/>
+    <dgm:style>
+      <a:lnRef idx="2">
+        <a:scrgbClr r="0" g="0" b="0"/>
+      </a:lnRef>
+      <a:fillRef idx="1">
+        <a:scrgbClr r="0" g="0" b="0"/>
+      </a:fillRef>
+      <a:effectRef idx="0">
+        <a:scrgbClr r="0" g="0" b="0"/>
+      </a:effectRef>
+      <a:fontRef idx="minor"/>
+    </dgm:style>
+  </dgm:styleLbl>
+  <dgm:styleLbl name="fgAcc4">
+    <dgm:scene3d>
+      <a:camera prst="orthographicFront"/>
+      <a:lightRig rig="threePt" dir="t"/>
+    </dgm:scene3d>
+    <dgm:sp3d/>
+    <dgm:txPr/>
+    <dgm:style>
+      <a:lnRef idx="2">
+        <a:scrgbClr r="0" g="0" b="0"/>
+      </a:lnRef>
+      <a:fillRef idx="1">
+        <a:scrgbClr r="0" g="0" b="0"/>
+      </a:fillRef>
+      <a:effectRef idx="0">
+        <a:scrgbClr r="0" g="0" b="0"/>
+      </a:effectRef>
+      <a:fontRef idx="minor"/>
+    </dgm:style>
+  </dgm:styleLbl>
+  <dgm:styleLbl name="bgShp">
+    <dgm:scene3d>
+      <a:camera prst="orthographicFront"/>
+      <a:lightRig rig="threePt" dir="t"/>
+    </dgm:scene3d>
+    <dgm:sp3d/>
+    <dgm:txPr/>
+    <dgm:style>
+      <a:lnRef idx="0">
+        <a:scrgbClr r="0" g="0" b="0"/>
+      </a:lnRef>
+      <a:fillRef idx="1">
+        <a:scrgbClr r="0" g="0" b="0"/>
+      </a:fillRef>
+      <a:effectRef idx="0">
+        <a:scrgbClr r="0" g="0" b="0"/>
+      </a:effectRef>
+      <a:fontRef idx="minor"/>
+    </dgm:style>
+  </dgm:styleLbl>
+  <dgm:styleLbl name="dkBgShp">
+    <dgm:scene3d>
+      <a:camera prst="orthographicFront"/>
+      <a:lightRig rig="threePt" dir="t"/>
+    </dgm:scene3d>
+    <dgm:sp3d/>
+    <dgm:txPr/>
+    <dgm:style>
+      <a:lnRef idx="0">
+        <a:scrgbClr r="0" g="0" b="0"/>
+      </a:lnRef>
+      <a:fillRef idx="1">
+        <a:scrgbClr r="0" g="0" b="0"/>
+      </a:fillRef>
+      <a:effectRef idx="0">
+        <a:scrgbClr r="0" g="0" b="0"/>
+      </a:effectRef>
+      <a:fontRef idx="minor"/>
+    </dgm:style>
+  </dgm:styleLbl>
+  <dgm:styleLbl name="trBgShp">
+    <dgm:scene3d>
+      <a:camera prst="orthographicFront"/>
+      <a:lightRig rig="threePt" dir="t"/>
+    </dgm:scene3d>
+    <dgm:sp3d/>
+    <dgm:txPr/>
+    <dgm:style>
+      <a:lnRef idx="0">
+        <a:scrgbClr r="0" g="0" b="0"/>
+      </a:lnRef>
+      <a:fillRef idx="1">
+        <a:scrgbClr r="0" g="0" b="0"/>
+      </a:fillRef>
+      <a:effectRef idx="0">
+        <a:scrgbClr r="0" g="0" b="0"/>
+      </a:effectRef>
+      <a:fontRef idx="minor"/>
+    </dgm:style>
+  </dgm:styleLbl>
+  <dgm:styleLbl name="fgShp">
+    <dgm:scene3d>
+      <a:camera prst="orthographicFront"/>
+      <a:lightRig rig="threePt" dir="t"/>
+    </dgm:scene3d>
+    <dgm:sp3d/>
+    <dgm:txPr/>
+    <dgm:style>
+      <a:lnRef idx="2">
+        <a:scrgbClr r="0" g="0" b="0"/>
+      </a:lnRef>
+      <a:fillRef idx="1">
+        <a:scrgbClr r="0" g="0" b="0"/>
+      </a:fillRef>
+      <a:effectRef idx="0">
+        <a:scrgbClr r="0" g="0" b="0"/>
+      </a:effectRef>
+      <a:fontRef idx="minor"/>
+    </dgm:style>
+  </dgm:styleLbl>
+  <dgm:styleLbl name="revTx">
+    <dgm:scene3d>
+      <a:camera prst="orthographicFront"/>
+      <a:lightRig rig="threePt" dir="t"/>
+    </dgm:scene3d>
+    <dgm:sp3d/>
+    <dgm:txPr/>
+    <dgm:style>
+      <a:lnRef idx="0">
+        <a:scrgbClr r="0" g="0" b="0"/>
+      </a:lnRef>
+      <a:fillRef idx="0">
+        <a:scrgbClr r="0" g="0" b="0"/>
+      </a:fillRef>
+      <a:effectRef idx="0">
+        <a:scrgbClr r="0" g="0" b="0"/>
+      </a:effectRef>
+      <a:fontRef idx="minor"/>
+    </dgm:style>
+  </dgm:styleLbl>
+</dgm:styleDef>
+</file>
+
 <file path=ppt/notesMasters/notesMaster1.xml><?xml version="1.0" encoding="utf-8"?>
 <p:notesMaster xmlns:a="http://schemas.openxmlformats.org/drawingml/2006/main" xmlns:r="http://schemas.openxmlformats.org/officeDocument/2006/relationships" xmlns:p="http://schemas.openxmlformats.org/presentationml/2006/main">
   <p:cSld>
@@ -200,7 +2555,8 @@
           <a:p>
             <a:fld id="{0EE3E21C-78C9-435D-9F16-145921DB3A5A}" type="datetimeFigureOut">
               <a:rPr lang="de-DE" smtClean="0"/>
-              <a:t>10.01.2016</a:t>
+              <a:pPr/>
+              <a:t>16.01.2016</a:t>
             </a:fld>
             <a:endParaRPr lang="de-DE"/>
           </a:p>
@@ -361,6 +2717,7 @@
           <a:p>
             <a:fld id="{318373F8-FC42-4DBB-90C0-1B64F0D064A8}" type="slidenum">
               <a:rPr lang="de-DE" smtClean="0"/>
+              <a:pPr/>
               <a:t>‹Nr.›</a:t>
             </a:fld>
             <a:endParaRPr lang="de-DE"/>
@@ -596,7 +2953,8 @@
           <a:p>
             <a:fld id="{318373F8-FC42-4DBB-90C0-1B64F0D064A8}" type="slidenum">
               <a:rPr lang="de-DE" smtClean="0"/>
-              <a:t>5</a:t>
+              <a:pPr/>
+              <a:t>13</a:t>
             </a:fld>
             <a:endParaRPr lang="de-DE"/>
           </a:p>
@@ -689,7 +3047,8 @@
           <a:p>
             <a:fld id="{318373F8-FC42-4DBB-90C0-1B64F0D064A8}" type="slidenum">
               <a:rPr lang="de-DE" smtClean="0"/>
-              <a:t>6</a:t>
+              <a:pPr/>
+              <a:t>14</a:t>
             </a:fld>
             <a:endParaRPr lang="de-DE"/>
           </a:p>
@@ -1361,7 +3720,8 @@
           <a:p>
             <a:fld id="{EAAA11DB-FCE1-432F-BBE7-108BD170E889}" type="datetimeFigureOut">
               <a:rPr lang="de-DE" smtClean="0"/>
-              <a:t>10.01.2016</a:t>
+              <a:pPr/>
+              <a:t>16.01.2016</a:t>
             </a:fld>
             <a:endParaRPr lang="de-DE"/>
           </a:p>
@@ -1421,6 +3781,7 @@
           <a:p>
             <a:fld id="{497E1616-9FB3-42C1-9995-E08C91585268}" type="slidenum">
               <a:rPr lang="de-DE" smtClean="0"/>
+              <a:pPr/>
               <a:t>‹Nr.›</a:t>
             </a:fld>
             <a:endParaRPr lang="de-DE"/>
@@ -1544,7 +3905,8 @@
           <a:p>
             <a:fld id="{EAAA11DB-FCE1-432F-BBE7-108BD170E889}" type="datetimeFigureOut">
               <a:rPr lang="de-DE" smtClean="0"/>
-              <a:t>10.01.2016</a:t>
+              <a:pPr/>
+              <a:t>16.01.2016</a:t>
             </a:fld>
             <a:endParaRPr lang="de-DE"/>
           </a:p>
@@ -1586,6 +3948,7 @@
           <a:p>
             <a:fld id="{497E1616-9FB3-42C1-9995-E08C91585268}" type="slidenum">
               <a:rPr lang="de-DE" smtClean="0"/>
+              <a:pPr/>
               <a:t>‹Nr.›</a:t>
             </a:fld>
             <a:endParaRPr lang="de-DE"/>
@@ -1719,7 +4082,8 @@
           <a:p>
             <a:fld id="{EAAA11DB-FCE1-432F-BBE7-108BD170E889}" type="datetimeFigureOut">
               <a:rPr lang="de-DE" smtClean="0"/>
-              <a:t>10.01.2016</a:t>
+              <a:pPr/>
+              <a:t>16.01.2016</a:t>
             </a:fld>
             <a:endParaRPr lang="de-DE"/>
           </a:p>
@@ -1761,6 +4125,7 @@
           <a:p>
             <a:fld id="{497E1616-9FB3-42C1-9995-E08C91585268}" type="slidenum">
               <a:rPr lang="de-DE" smtClean="0"/>
+              <a:pPr/>
               <a:t>‹Nr.›</a:t>
             </a:fld>
             <a:endParaRPr lang="de-DE"/>
@@ -1884,7 +4249,8 @@
           <a:p>
             <a:fld id="{EAAA11DB-FCE1-432F-BBE7-108BD170E889}" type="datetimeFigureOut">
               <a:rPr lang="de-DE" smtClean="0"/>
-              <a:t>10.01.2016</a:t>
+              <a:pPr/>
+              <a:t>16.01.2016</a:t>
             </a:fld>
             <a:endParaRPr lang="de-DE"/>
           </a:p>
@@ -1926,6 +4292,7 @@
           <a:p>
             <a:fld id="{497E1616-9FB3-42C1-9995-E08C91585268}" type="slidenum">
               <a:rPr lang="de-DE" smtClean="0"/>
+              <a:pPr/>
               <a:t>‹Nr.›</a:t>
             </a:fld>
             <a:endParaRPr lang="de-DE"/>
@@ -2105,7 +4472,8 @@
           <a:p>
             <a:fld id="{EAAA11DB-FCE1-432F-BBE7-108BD170E889}" type="datetimeFigureOut">
               <a:rPr lang="de-DE" smtClean="0"/>
-              <a:t>10.01.2016</a:t>
+              <a:pPr/>
+              <a:t>16.01.2016</a:t>
             </a:fld>
             <a:endParaRPr lang="de-DE"/>
           </a:p>
@@ -2147,6 +4515,7 @@
           <a:p>
             <a:fld id="{497E1616-9FB3-42C1-9995-E08C91585268}" type="slidenum">
               <a:rPr lang="de-DE" smtClean="0"/>
+              <a:pPr/>
               <a:t>‹Nr.›</a:t>
             </a:fld>
             <a:endParaRPr lang="de-DE"/>
@@ -2364,7 +4733,8 @@
           <a:p>
             <a:fld id="{EAAA11DB-FCE1-432F-BBE7-108BD170E889}" type="datetimeFigureOut">
               <a:rPr lang="de-DE" smtClean="0"/>
-              <a:t>10.01.2016</a:t>
+              <a:pPr/>
+              <a:t>16.01.2016</a:t>
             </a:fld>
             <a:endParaRPr lang="de-DE"/>
           </a:p>
@@ -2406,6 +4776,7 @@
           <a:p>
             <a:fld id="{497E1616-9FB3-42C1-9995-E08C91585268}" type="slidenum">
               <a:rPr lang="de-DE" smtClean="0"/>
+              <a:pPr/>
               <a:t>‹Nr.›</a:t>
             </a:fld>
             <a:endParaRPr lang="de-DE"/>
@@ -2768,7 +5139,8 @@
           <a:p>
             <a:fld id="{EAAA11DB-FCE1-432F-BBE7-108BD170E889}" type="datetimeFigureOut">
               <a:rPr lang="de-DE" smtClean="0"/>
-              <a:t>10.01.2016</a:t>
+              <a:pPr/>
+              <a:t>16.01.2016</a:t>
             </a:fld>
             <a:endParaRPr lang="de-DE"/>
           </a:p>
@@ -2791,6 +5163,7 @@
           <a:p>
             <a:fld id="{497E1616-9FB3-42C1-9995-E08C91585268}" type="slidenum">
               <a:rPr lang="de-DE" smtClean="0"/>
+              <a:pPr/>
               <a:t>‹Nr.›</a:t>
             </a:fld>
             <a:endParaRPr lang="de-DE"/>
@@ -2899,7 +5272,8 @@
           <a:p>
             <a:fld id="{EAAA11DB-FCE1-432F-BBE7-108BD170E889}" type="datetimeFigureOut">
               <a:rPr lang="de-DE" smtClean="0"/>
-              <a:t>10.01.2016</a:t>
+              <a:pPr/>
+              <a:t>16.01.2016</a:t>
             </a:fld>
             <a:endParaRPr lang="de-DE"/>
           </a:p>
@@ -2951,6 +5325,7 @@
           <a:p>
             <a:fld id="{497E1616-9FB3-42C1-9995-E08C91585268}" type="slidenum">
               <a:rPr lang="de-DE" smtClean="0"/>
+              <a:pPr/>
               <a:t>‹Nr.›</a:t>
             </a:fld>
             <a:endParaRPr lang="de-DE"/>
@@ -2999,7 +5374,8 @@
           <a:p>
             <a:fld id="{EAAA11DB-FCE1-432F-BBE7-108BD170E889}" type="datetimeFigureOut">
               <a:rPr lang="de-DE" smtClean="0"/>
-              <a:t>10.01.2016</a:t>
+              <a:pPr/>
+              <a:t>16.01.2016</a:t>
             </a:fld>
             <a:endParaRPr lang="de-DE"/>
           </a:p>
@@ -3041,6 +5417,7 @@
           <a:p>
             <a:fld id="{497E1616-9FB3-42C1-9995-E08C91585268}" type="slidenum">
               <a:rPr lang="de-DE" smtClean="0"/>
+              <a:pPr/>
               <a:t>‹Nr.›</a:t>
             </a:fld>
             <a:endParaRPr lang="de-DE"/>
@@ -3244,7 +5621,8 @@
           <a:p>
             <a:fld id="{EAAA11DB-FCE1-432F-BBE7-108BD170E889}" type="datetimeFigureOut">
               <a:rPr lang="de-DE" smtClean="0"/>
-              <a:t>10.01.2016</a:t>
+              <a:pPr/>
+              <a:t>16.01.2016</a:t>
             </a:fld>
             <a:endParaRPr lang="de-DE"/>
           </a:p>
@@ -3286,6 +5664,7 @@
           <a:p>
             <a:fld id="{497E1616-9FB3-42C1-9995-E08C91585268}" type="slidenum">
               <a:rPr lang="de-DE" smtClean="0"/>
+              <a:pPr/>
               <a:t>‹Nr.›</a:t>
             </a:fld>
             <a:endParaRPr lang="de-DE"/>
@@ -3488,7 +5867,8 @@
           <a:p>
             <a:fld id="{EAAA11DB-FCE1-432F-BBE7-108BD170E889}" type="datetimeFigureOut">
               <a:rPr lang="de-DE" smtClean="0"/>
-              <a:t>10.01.2016</a:t>
+              <a:pPr/>
+              <a:t>16.01.2016</a:t>
             </a:fld>
             <a:endParaRPr lang="de-DE"/>
           </a:p>
@@ -3530,6 +5910,7 @@
           <a:p>
             <a:fld id="{497E1616-9FB3-42C1-9995-E08C91585268}" type="slidenum">
               <a:rPr lang="de-DE" smtClean="0"/>
+              <a:pPr/>
               <a:t>‹Nr.›</a:t>
             </a:fld>
             <a:endParaRPr lang="de-DE"/>
@@ -4312,7 +6693,8 @@
           <a:p>
             <a:fld id="{EAAA11DB-FCE1-432F-BBE7-108BD170E889}" type="datetimeFigureOut">
               <a:rPr lang="de-DE" smtClean="0"/>
-              <a:t>10.01.2016</a:t>
+              <a:pPr/>
+              <a:t>16.01.2016</a:t>
             </a:fld>
             <a:endParaRPr lang="de-DE"/>
           </a:p>
@@ -4386,6 +6768,7 @@
           <a:p>
             <a:fld id="{497E1616-9FB3-42C1-9995-E08C91585268}" type="slidenum">
               <a:rPr lang="de-DE" smtClean="0"/>
+              <a:pPr/>
               <a:t>‹Nr.›</a:t>
             </a:fld>
             <a:endParaRPr lang="de-DE"/>
@@ -4782,7 +7165,7 @@
 </p:sld>
 </file>
 
-<file path=ppt/slides/slide2.xml><?xml version="1.0" encoding="utf-8"?>
+<file path=ppt/slides/slide10.xml><?xml version="1.0" encoding="utf-8"?>
 <p:sld xmlns:a="http://schemas.openxmlformats.org/drawingml/2006/main" xmlns:r="http://schemas.openxmlformats.org/officeDocument/2006/relationships" xmlns:p="http://schemas.openxmlformats.org/presentationml/2006/main">
   <p:cSld>
     <p:spTree>
@@ -4799,85 +7182,39 @@
           <a:chExt cx="0" cy="0"/>
         </a:xfrm>
       </p:grpSpPr>
-      <p:sp>
-        <p:nvSpPr>
-          <p:cNvPr id="2" name="Titel 1"/>
-          <p:cNvSpPr>
-            <a:spLocks noGrp="1"/>
-          </p:cNvSpPr>
-          <p:nvPr>
-            <p:ph type="title"/>
-          </p:nvPr>
-        </p:nvSpPr>
-        <p:spPr/>
-        <p:txBody>
-          <a:bodyPr/>
-          <a:lstStyle/>
-          <a:p>
-            <a:r>
-              <a:rPr lang="de-DE" dirty="0" smtClean="0"/>
-              <a:t>Gliederung</a:t>
-            </a:r>
-            <a:endParaRPr lang="de-DE" dirty="0"/>
-          </a:p>
-        </p:txBody>
-      </p:sp>
-      <p:sp>
-        <p:nvSpPr>
-          <p:cNvPr id="3" name="Inhaltsplatzhalter 2"/>
-          <p:cNvSpPr>
-            <a:spLocks noGrp="1"/>
-          </p:cNvSpPr>
-          <p:nvPr>
-            <p:ph idx="1"/>
-          </p:nvPr>
-        </p:nvSpPr>
-        <p:spPr/>
-        <p:txBody>
-          <a:bodyPr/>
-          <a:lstStyle/>
-          <a:p>
-            <a:r>
-              <a:rPr lang="de-DE" dirty="0" smtClean="0"/>
-              <a:t>Planspiel</a:t>
-            </a:r>
-          </a:p>
-          <a:p>
-            <a:pPr lvl="1"/>
-            <a:r>
-              <a:rPr lang="de-DE" dirty="0" smtClean="0"/>
-              <a:t>Strategie</a:t>
-            </a:r>
-          </a:p>
-          <a:p>
-            <a:pPr lvl="1"/>
-            <a:r>
-              <a:rPr lang="de-DE" dirty="0" smtClean="0"/>
-              <a:t>Zielsetzung</a:t>
-            </a:r>
-          </a:p>
-          <a:p>
-            <a:pPr lvl="1"/>
-            <a:r>
-              <a:rPr lang="de-DE" dirty="0" smtClean="0"/>
-              <a:t>Ergebnisse</a:t>
-            </a:r>
-          </a:p>
-          <a:p>
-            <a:r>
-              <a:rPr lang="de-DE" dirty="0" smtClean="0"/>
-              <a:t>Technologie</a:t>
-            </a:r>
-          </a:p>
-          <a:p>
-            <a:r>
-              <a:rPr lang="de-DE" dirty="0" smtClean="0"/>
-              <a:t>Live-Demonstration</a:t>
-            </a:r>
-            <a:endParaRPr lang="de-DE" dirty="0"/>
-          </a:p>
-        </p:txBody>
-      </p:sp>
+      <p:pic>
+        <p:nvPicPr>
+          <p:cNvPr id="4" name="Picture 2"/>
+          <p:cNvPicPr>
+            <a:picLocks noChangeAspect="1" noChangeArrowheads="1"/>
+          </p:cNvPicPr>
+          <p:nvPr/>
+        </p:nvPicPr>
+        <p:blipFill>
+          <a:blip r:embed="rId2"/>
+          <a:srcRect/>
+          <a:stretch>
+            <a:fillRect/>
+          </a:stretch>
+        </p:blipFill>
+        <p:spPr bwMode="auto">
+          <a:xfrm>
+            <a:off x="72594" y="1170229"/>
+            <a:ext cx="9000000" cy="5616357"/>
+          </a:xfrm>
+          <a:prstGeom prst="rect">
+            <a:avLst/>
+          </a:prstGeom>
+          <a:noFill/>
+          <a:ln w="9525">
+            <a:noFill/>
+            <a:miter lim="800000"/>
+            <a:headEnd/>
+            <a:tailEnd/>
+          </a:ln>
+          <a:effectLst/>
+        </p:spPr>
+      </p:pic>
     </p:spTree>
   </p:cSld>
   <p:clrMapOvr>
@@ -4893,7 +7230,7 @@
 </p:sld>
 </file>
 
-<file path=ppt/slides/slide3.xml><?xml version="1.0" encoding="utf-8"?>
+<file path=ppt/slides/slide11.xml><?xml version="1.0" encoding="utf-8"?>
 <p:sld xmlns:a="http://schemas.openxmlformats.org/drawingml/2006/main" xmlns:r="http://schemas.openxmlformats.org/officeDocument/2006/relationships" xmlns:p="http://schemas.openxmlformats.org/presentationml/2006/main">
   <p:cSld>
     <p:spTree>
@@ -4920,35 +7257,24 @@
             <p:ph type="title"/>
           </p:nvPr>
         </p:nvSpPr>
-        <p:spPr/>
-        <p:txBody>
-          <a:bodyPr/>
+        <p:spPr>
+          <a:xfrm>
+            <a:off x="2000232" y="2428868"/>
+            <a:ext cx="5214974" cy="1928826"/>
+          </a:xfrm>
+        </p:spPr>
+        <p:txBody>
+          <a:bodyPr>
+            <a:noAutofit/>
+          </a:bodyPr>
           <a:lstStyle/>
           <a:p>
-            <a:r>
-              <a:rPr lang="de-DE" dirty="0" smtClean="0"/>
-              <a:t>Planspiel</a:t>
-            </a:r>
-            <a:endParaRPr lang="de-DE" dirty="0"/>
-          </a:p>
-        </p:txBody>
-      </p:sp>
-      <p:sp>
-        <p:nvSpPr>
-          <p:cNvPr id="3" name="Inhaltsplatzhalter 2"/>
-          <p:cNvSpPr>
-            <a:spLocks noGrp="1"/>
-          </p:cNvSpPr>
-          <p:nvPr>
-            <p:ph idx="1"/>
-          </p:nvPr>
-        </p:nvSpPr>
-        <p:spPr/>
-        <p:txBody>
-          <a:bodyPr/>
-          <a:lstStyle/>
-          <a:p>
-            <a:endParaRPr lang="de-DE" dirty="0"/>
+            <a:pPr algn="ctr"/>
+            <a:r>
+              <a:rPr lang="de-DE" sz="7000" dirty="0" smtClean="0"/>
+              <a:t>Technologie</a:t>
+            </a:r>
+            <a:endParaRPr lang="de-DE" sz="7000" dirty="0"/>
           </a:p>
         </p:txBody>
       </p:sp>
@@ -4967,7 +7293,7 @@
 </p:sld>
 </file>
 
-<file path=ppt/slides/slide4.xml><?xml version="1.0" encoding="utf-8"?>
+<file path=ppt/slides/slide12.xml><?xml version="1.0" encoding="utf-8"?>
 <p:sld xmlns:a="http://schemas.openxmlformats.org/drawingml/2006/main" xmlns:r="http://schemas.openxmlformats.org/officeDocument/2006/relationships" xmlns:p="http://schemas.openxmlformats.org/presentationml/2006/main">
   <p:cSld>
     <p:spTree>
@@ -5067,6 +7393,828 @@
 </p:sld>
 </file>
 
+<file path=ppt/slides/slide13.xml><?xml version="1.0" encoding="utf-8"?>
+<p:sld xmlns:a="http://schemas.openxmlformats.org/drawingml/2006/main" xmlns:r="http://schemas.openxmlformats.org/officeDocument/2006/relationships" xmlns:p="http://schemas.openxmlformats.org/presentationml/2006/main">
+  <p:cSld>
+    <p:spTree>
+      <p:nvGrpSpPr>
+        <p:cNvPr id="1" name=""/>
+        <p:cNvGrpSpPr/>
+        <p:nvPr/>
+      </p:nvGrpSpPr>
+      <p:grpSpPr>
+        <a:xfrm>
+          <a:off x="0" y="0"/>
+          <a:ext cx="0" cy="0"/>
+          <a:chOff x="0" y="0"/>
+          <a:chExt cx="0" cy="0"/>
+        </a:xfrm>
+      </p:grpSpPr>
+      <p:sp>
+        <p:nvSpPr>
+          <p:cNvPr id="2" name="Titel 1"/>
+          <p:cNvSpPr>
+            <a:spLocks noGrp="1"/>
+          </p:cNvSpPr>
+          <p:nvPr>
+            <p:ph type="title"/>
+          </p:nvPr>
+        </p:nvSpPr>
+        <p:spPr/>
+        <p:txBody>
+          <a:bodyPr/>
+          <a:lstStyle/>
+          <a:p>
+            <a:r>
+              <a:rPr lang="de-DE" dirty="0" smtClean="0"/>
+              <a:t>Webanwendung</a:t>
+            </a:r>
+            <a:endParaRPr lang="de-DE" dirty="0"/>
+          </a:p>
+        </p:txBody>
+      </p:sp>
+      <p:pic>
+        <p:nvPicPr>
+          <p:cNvPr id="4098" name="Picture 2"/>
+          <p:cNvPicPr>
+            <a:picLocks noChangeAspect="1" noChangeArrowheads="1"/>
+          </p:cNvPicPr>
+          <p:nvPr/>
+        </p:nvPicPr>
+        <p:blipFill>
+          <a:blip r:embed="rId3"/>
+          <a:srcRect/>
+          <a:stretch>
+            <a:fillRect/>
+          </a:stretch>
+        </p:blipFill>
+        <p:spPr bwMode="auto">
+          <a:xfrm>
+            <a:off x="0" y="1984219"/>
+            <a:ext cx="9144032" cy="4873805"/>
+          </a:xfrm>
+          <a:prstGeom prst="rect">
+            <a:avLst/>
+          </a:prstGeom>
+          <a:noFill/>
+          <a:ln w="9525">
+            <a:noFill/>
+            <a:miter lim="800000"/>
+            <a:headEnd/>
+            <a:tailEnd/>
+          </a:ln>
+          <a:effectLst/>
+        </p:spPr>
+      </p:pic>
+    </p:spTree>
+  </p:cSld>
+  <p:clrMapOvr>
+    <a:masterClrMapping/>
+  </p:clrMapOvr>
+  <p:timing>
+    <p:tnLst>
+      <p:par>
+        <p:cTn id="1" dur="indefinite" restart="never" nodeType="tmRoot"/>
+      </p:par>
+    </p:tnLst>
+  </p:timing>
+</p:sld>
+</file>
+
+<file path=ppt/slides/slide14.xml><?xml version="1.0" encoding="utf-8"?>
+<p:sld xmlns:a="http://schemas.openxmlformats.org/drawingml/2006/main" xmlns:r="http://schemas.openxmlformats.org/officeDocument/2006/relationships" xmlns:p="http://schemas.openxmlformats.org/presentationml/2006/main">
+  <p:cSld>
+    <p:spTree>
+      <p:nvGrpSpPr>
+        <p:cNvPr id="1" name=""/>
+        <p:cNvGrpSpPr/>
+        <p:nvPr/>
+      </p:nvGrpSpPr>
+      <p:grpSpPr>
+        <a:xfrm>
+          <a:off x="0" y="0"/>
+          <a:ext cx="0" cy="0"/>
+          <a:chOff x="0" y="0"/>
+          <a:chExt cx="0" cy="0"/>
+        </a:xfrm>
+      </p:grpSpPr>
+      <p:sp>
+        <p:nvSpPr>
+          <p:cNvPr id="2" name="Titel 1"/>
+          <p:cNvSpPr>
+            <a:spLocks noGrp="1"/>
+          </p:cNvSpPr>
+          <p:nvPr>
+            <p:ph type="title"/>
+          </p:nvPr>
+        </p:nvSpPr>
+        <p:spPr/>
+        <p:txBody>
+          <a:bodyPr/>
+          <a:lstStyle/>
+          <a:p>
+            <a:r>
+              <a:rPr lang="de-DE" dirty="0" smtClean="0"/>
+              <a:t>MEAN-</a:t>
+            </a:r>
+            <a:r>
+              <a:rPr lang="de-DE" dirty="0" err="1" smtClean="0"/>
+              <a:t>Stack</a:t>
+            </a:r>
+            <a:endParaRPr lang="de-DE" dirty="0"/>
+          </a:p>
+        </p:txBody>
+      </p:sp>
+      <p:pic>
+        <p:nvPicPr>
+          <p:cNvPr id="4" name="Inhaltsplatzhalter 3" descr="https://i.ytimg.com/vi/Jh0er2pRcq8/maxresdefault.jpg"/>
+          <p:cNvPicPr>
+            <a:picLocks noGrp="1"/>
+          </p:cNvPicPr>
+          <p:nvPr>
+            <p:ph idx="1"/>
+          </p:nvPr>
+        </p:nvPicPr>
+        <p:blipFill>
+          <a:blip r:embed="rId3" cstate="print"/>
+          <a:srcRect/>
+          <a:stretch>
+            <a:fillRect/>
+          </a:stretch>
+        </p:blipFill>
+        <p:spPr bwMode="auto">
+          <a:xfrm>
+            <a:off x="3428992" y="3357562"/>
+            <a:ext cx="5545915" cy="3393104"/>
+          </a:xfrm>
+          <a:prstGeom prst="rect">
+            <a:avLst/>
+          </a:prstGeom>
+          <a:noFill/>
+          <a:ln w="9525">
+            <a:noFill/>
+            <a:miter lim="800000"/>
+            <a:headEnd/>
+            <a:tailEnd/>
+          </a:ln>
+        </p:spPr>
+      </p:pic>
+      <p:sp>
+        <p:nvSpPr>
+          <p:cNvPr id="6" name="Textfeld 5"/>
+          <p:cNvSpPr txBox="1"/>
+          <p:nvPr/>
+        </p:nvSpPr>
+        <p:spPr>
+          <a:xfrm>
+            <a:off x="428596" y="2357430"/>
+            <a:ext cx="5000660" cy="1200329"/>
+          </a:xfrm>
+          <a:prstGeom prst="rect">
+            <a:avLst/>
+          </a:prstGeom>
+          <a:noFill/>
+        </p:spPr>
+        <p:txBody>
+          <a:bodyPr wrap="square" rtlCol="0">
+            <a:spAutoFit/>
+          </a:bodyPr>
+          <a:lstStyle/>
+          <a:p>
+            <a:pPr>
+              <a:buFont typeface="Arial" pitchFamily="34" charset="0"/>
+              <a:buChar char="•"/>
+            </a:pPr>
+            <a:r>
+              <a:rPr lang="de-DE" dirty="0" smtClean="0"/>
+              <a:t> Mongo DB</a:t>
+            </a:r>
+          </a:p>
+          <a:p>
+            <a:pPr>
+              <a:buFont typeface="Arial" pitchFamily="34" charset="0"/>
+              <a:buChar char="•"/>
+            </a:pPr>
+            <a:r>
+              <a:rPr lang="de-DE" dirty="0" smtClean="0"/>
+              <a:t> Express </a:t>
+            </a:r>
+          </a:p>
+          <a:p>
+            <a:pPr>
+              <a:buFont typeface="Arial" pitchFamily="34" charset="0"/>
+              <a:buChar char="•"/>
+            </a:pPr>
+            <a:r>
+              <a:rPr lang="de-DE" dirty="0" smtClean="0"/>
+              <a:t> </a:t>
+            </a:r>
+            <a:r>
+              <a:rPr lang="de-DE" dirty="0" err="1" smtClean="0"/>
+              <a:t>AngularJS</a:t>
+            </a:r>
+            <a:endParaRPr lang="de-DE" dirty="0" smtClean="0"/>
+          </a:p>
+          <a:p>
+            <a:pPr>
+              <a:buFont typeface="Arial" pitchFamily="34" charset="0"/>
+              <a:buChar char="•"/>
+            </a:pPr>
+            <a:r>
+              <a:rPr lang="de-DE" dirty="0" smtClean="0"/>
+              <a:t> </a:t>
+            </a:r>
+            <a:r>
+              <a:rPr lang="de-DE" dirty="0" err="1" smtClean="0"/>
+              <a:t>NodeJs</a:t>
+            </a:r>
+            <a:endParaRPr lang="de-DE" dirty="0"/>
+          </a:p>
+        </p:txBody>
+      </p:sp>
+    </p:spTree>
+  </p:cSld>
+  <p:clrMapOvr>
+    <a:masterClrMapping/>
+  </p:clrMapOvr>
+  <p:timing>
+    <p:tnLst>
+      <p:par>
+        <p:cTn id="1" dur="indefinite" restart="never" nodeType="tmRoot"/>
+      </p:par>
+    </p:tnLst>
+  </p:timing>
+</p:sld>
+</file>
+
+<file path=ppt/slides/slide15.xml><?xml version="1.0" encoding="utf-8"?>
+<p:sld xmlns:a="http://schemas.openxmlformats.org/drawingml/2006/main" xmlns:r="http://schemas.openxmlformats.org/officeDocument/2006/relationships" xmlns:p="http://schemas.openxmlformats.org/presentationml/2006/main">
+  <p:cSld>
+    <p:spTree>
+      <p:nvGrpSpPr>
+        <p:cNvPr id="1" name=""/>
+        <p:cNvGrpSpPr/>
+        <p:nvPr/>
+      </p:nvGrpSpPr>
+      <p:grpSpPr>
+        <a:xfrm>
+          <a:off x="0" y="0"/>
+          <a:ext cx="0" cy="0"/>
+          <a:chOff x="0" y="0"/>
+          <a:chExt cx="0" cy="0"/>
+        </a:xfrm>
+      </p:grpSpPr>
+      <p:sp>
+        <p:nvSpPr>
+          <p:cNvPr id="2" name="Titel 1"/>
+          <p:cNvSpPr>
+            <a:spLocks noGrp="1"/>
+          </p:cNvSpPr>
+          <p:nvPr>
+            <p:ph type="title"/>
+          </p:nvPr>
+        </p:nvSpPr>
+        <p:spPr/>
+        <p:txBody>
+          <a:bodyPr/>
+          <a:lstStyle/>
+          <a:p>
+            <a:r>
+              <a:rPr lang="de-DE" dirty="0" smtClean="0"/>
+              <a:t>Programmiersprache</a:t>
+            </a:r>
+            <a:endParaRPr lang="de-DE" dirty="0"/>
+          </a:p>
+        </p:txBody>
+      </p:sp>
+      <p:sp>
+        <p:nvSpPr>
+          <p:cNvPr id="3" name="Inhaltsplatzhalter 2"/>
+          <p:cNvSpPr>
+            <a:spLocks noGrp="1"/>
+          </p:cNvSpPr>
+          <p:nvPr>
+            <p:ph idx="1"/>
+          </p:nvPr>
+        </p:nvSpPr>
+        <p:spPr/>
+        <p:txBody>
+          <a:bodyPr/>
+          <a:lstStyle/>
+          <a:p>
+            <a:r>
+              <a:rPr lang="de-DE" dirty="0" err="1" smtClean="0"/>
+              <a:t>Typescript</a:t>
+            </a:r>
+            <a:endParaRPr lang="de-DE" dirty="0" smtClean="0"/>
+          </a:p>
+          <a:p>
+            <a:pPr lvl="1"/>
+            <a:r>
+              <a:rPr lang="de-DE" dirty="0" err="1" smtClean="0"/>
+              <a:t>Superset</a:t>
+            </a:r>
+            <a:r>
+              <a:rPr lang="de-DE" dirty="0" smtClean="0"/>
+              <a:t> von </a:t>
+            </a:r>
+            <a:r>
+              <a:rPr lang="de-DE" dirty="0" err="1" smtClean="0"/>
+              <a:t>Javascript</a:t>
+            </a:r>
+            <a:endParaRPr lang="de-DE" dirty="0" smtClean="0"/>
+          </a:p>
+          <a:p>
+            <a:pPr lvl="1"/>
+            <a:r>
+              <a:rPr lang="de-DE" dirty="0" smtClean="0"/>
+              <a:t>Starke Typisierung</a:t>
+            </a:r>
+            <a:endParaRPr lang="de-DE" dirty="0"/>
+          </a:p>
+        </p:txBody>
+      </p:sp>
+    </p:spTree>
+  </p:cSld>
+  <p:clrMapOvr>
+    <a:masterClrMapping/>
+  </p:clrMapOvr>
+  <p:timing>
+    <p:tnLst>
+      <p:par>
+        <p:cTn id="1" dur="indefinite" restart="never" nodeType="tmRoot"/>
+      </p:par>
+    </p:tnLst>
+  </p:timing>
+</p:sld>
+</file>
+
+<file path=ppt/slides/slide16.xml><?xml version="1.0" encoding="utf-8"?>
+<p:sld xmlns:a="http://schemas.openxmlformats.org/drawingml/2006/main" xmlns:r="http://schemas.openxmlformats.org/officeDocument/2006/relationships" xmlns:p="http://schemas.openxmlformats.org/presentationml/2006/main">
+  <p:cSld>
+    <p:spTree>
+      <p:nvGrpSpPr>
+        <p:cNvPr id="1" name=""/>
+        <p:cNvGrpSpPr/>
+        <p:nvPr/>
+      </p:nvGrpSpPr>
+      <p:grpSpPr>
+        <a:xfrm>
+          <a:off x="0" y="0"/>
+          <a:ext cx="0" cy="0"/>
+          <a:chOff x="0" y="0"/>
+          <a:chExt cx="0" cy="0"/>
+        </a:xfrm>
+      </p:grpSpPr>
+      <p:sp>
+        <p:nvSpPr>
+          <p:cNvPr id="2" name="Titel 1"/>
+          <p:cNvSpPr>
+            <a:spLocks noGrp="1"/>
+          </p:cNvSpPr>
+          <p:nvPr>
+            <p:ph type="title"/>
+          </p:nvPr>
+        </p:nvSpPr>
+        <p:spPr/>
+        <p:txBody>
+          <a:bodyPr/>
+          <a:lstStyle/>
+          <a:p>
+            <a:r>
+              <a:rPr lang="de-DE" dirty="0" smtClean="0"/>
+              <a:t>Development Tools</a:t>
+            </a:r>
+            <a:endParaRPr lang="de-DE" dirty="0"/>
+          </a:p>
+        </p:txBody>
+      </p:sp>
+      <p:sp>
+        <p:nvSpPr>
+          <p:cNvPr id="3" name="Inhaltsplatzhalter 2"/>
+          <p:cNvSpPr>
+            <a:spLocks noGrp="1"/>
+          </p:cNvSpPr>
+          <p:nvPr>
+            <p:ph idx="1"/>
+          </p:nvPr>
+        </p:nvSpPr>
+        <p:spPr/>
+        <p:txBody>
+          <a:bodyPr/>
+          <a:lstStyle/>
+          <a:p>
+            <a:r>
+              <a:rPr lang="de-DE" dirty="0" err="1" smtClean="0"/>
+              <a:t>Git</a:t>
+            </a:r>
+            <a:endParaRPr lang="de-DE" dirty="0" smtClean="0"/>
+          </a:p>
+          <a:p>
+            <a:r>
+              <a:rPr lang="de-DE" dirty="0" err="1" smtClean="0"/>
+              <a:t>Gulp</a:t>
+            </a:r>
+            <a:endParaRPr lang="de-DE" dirty="0" smtClean="0"/>
+          </a:p>
+          <a:p>
+            <a:r>
+              <a:rPr lang="de-DE" dirty="0" err="1" smtClean="0"/>
+              <a:t>Npm</a:t>
+            </a:r>
+            <a:endParaRPr lang="de-DE" dirty="0" smtClean="0"/>
+          </a:p>
+          <a:p>
+            <a:r>
+              <a:rPr lang="de-DE" dirty="0" err="1" smtClean="0"/>
+              <a:t>Webstorm</a:t>
+            </a:r>
+            <a:endParaRPr lang="de-DE" dirty="0"/>
+          </a:p>
+        </p:txBody>
+      </p:sp>
+    </p:spTree>
+  </p:cSld>
+  <p:clrMapOvr>
+    <a:masterClrMapping/>
+  </p:clrMapOvr>
+  <p:timing>
+    <p:tnLst>
+      <p:par>
+        <p:cTn id="1" dur="indefinite" restart="never" nodeType="tmRoot"/>
+      </p:par>
+    </p:tnLst>
+  </p:timing>
+</p:sld>
+</file>
+
+<file path=ppt/slides/slide17.xml><?xml version="1.0" encoding="utf-8"?>
+<p:sld xmlns:a="http://schemas.openxmlformats.org/drawingml/2006/main" xmlns:r="http://schemas.openxmlformats.org/officeDocument/2006/relationships" xmlns:p="http://schemas.openxmlformats.org/presentationml/2006/main">
+  <p:cSld>
+    <p:spTree>
+      <p:nvGrpSpPr>
+        <p:cNvPr id="1" name=""/>
+        <p:cNvGrpSpPr/>
+        <p:nvPr/>
+      </p:nvGrpSpPr>
+      <p:grpSpPr>
+        <a:xfrm>
+          <a:off x="0" y="0"/>
+          <a:ext cx="0" cy="0"/>
+          <a:chOff x="0" y="0"/>
+          <a:chExt cx="0" cy="0"/>
+        </a:xfrm>
+      </p:grpSpPr>
+      <p:sp>
+        <p:nvSpPr>
+          <p:cNvPr id="5" name="Titel 1"/>
+          <p:cNvSpPr>
+            <a:spLocks noGrp="1"/>
+          </p:cNvSpPr>
+          <p:nvPr>
+            <p:ph type="title"/>
+          </p:nvPr>
+        </p:nvSpPr>
+        <p:spPr>
+          <a:xfrm>
+            <a:off x="214282" y="2428868"/>
+            <a:ext cx="8715436" cy="1928826"/>
+          </a:xfrm>
+        </p:spPr>
+        <p:txBody>
+          <a:bodyPr>
+            <a:noAutofit/>
+          </a:bodyPr>
+          <a:lstStyle/>
+          <a:p>
+            <a:pPr algn="ctr"/>
+            <a:r>
+              <a:rPr lang="de-DE" sz="7000" dirty="0" smtClean="0"/>
+              <a:t>Live-Demonstration</a:t>
+            </a:r>
+            <a:endParaRPr lang="de-DE" sz="7000" dirty="0"/>
+          </a:p>
+        </p:txBody>
+      </p:sp>
+    </p:spTree>
+  </p:cSld>
+  <p:clrMapOvr>
+    <a:masterClrMapping/>
+  </p:clrMapOvr>
+  <p:timing>
+    <p:tnLst>
+      <p:par>
+        <p:cTn id="1" dur="indefinite" restart="never" nodeType="tmRoot"/>
+      </p:par>
+    </p:tnLst>
+  </p:timing>
+</p:sld>
+</file>
+
+<file path=ppt/slides/slide2.xml><?xml version="1.0" encoding="utf-8"?>
+<p:sld xmlns:a="http://schemas.openxmlformats.org/drawingml/2006/main" xmlns:r="http://schemas.openxmlformats.org/officeDocument/2006/relationships" xmlns:p="http://schemas.openxmlformats.org/presentationml/2006/main">
+  <p:cSld>
+    <p:spTree>
+      <p:nvGrpSpPr>
+        <p:cNvPr id="1" name=""/>
+        <p:cNvGrpSpPr/>
+        <p:nvPr/>
+      </p:nvGrpSpPr>
+      <p:grpSpPr>
+        <a:xfrm>
+          <a:off x="0" y="0"/>
+          <a:ext cx="0" cy="0"/>
+          <a:chOff x="0" y="0"/>
+          <a:chExt cx="0" cy="0"/>
+        </a:xfrm>
+      </p:grpSpPr>
+      <p:sp>
+        <p:nvSpPr>
+          <p:cNvPr id="2" name="Titel 1"/>
+          <p:cNvSpPr>
+            <a:spLocks noGrp="1"/>
+          </p:cNvSpPr>
+          <p:nvPr>
+            <p:ph type="title"/>
+          </p:nvPr>
+        </p:nvSpPr>
+        <p:spPr/>
+        <p:txBody>
+          <a:bodyPr/>
+          <a:lstStyle/>
+          <a:p>
+            <a:r>
+              <a:rPr lang="de-DE" dirty="0" smtClean="0"/>
+              <a:t>Gliederung</a:t>
+            </a:r>
+            <a:endParaRPr lang="de-DE" dirty="0"/>
+          </a:p>
+        </p:txBody>
+      </p:sp>
+      <p:sp>
+        <p:nvSpPr>
+          <p:cNvPr id="3" name="Inhaltsplatzhalter 2"/>
+          <p:cNvSpPr>
+            <a:spLocks noGrp="1"/>
+          </p:cNvSpPr>
+          <p:nvPr>
+            <p:ph idx="1"/>
+          </p:nvPr>
+        </p:nvSpPr>
+        <p:spPr/>
+        <p:txBody>
+          <a:bodyPr/>
+          <a:lstStyle/>
+          <a:p>
+            <a:r>
+              <a:rPr lang="de-DE" dirty="0" smtClean="0"/>
+              <a:t>Einführung</a:t>
+            </a:r>
+          </a:p>
+          <a:p>
+            <a:r>
+              <a:rPr lang="de-DE" dirty="0" smtClean="0"/>
+              <a:t>Planspiel</a:t>
+            </a:r>
+            <a:endParaRPr lang="de-DE" dirty="0" smtClean="0"/>
+          </a:p>
+          <a:p>
+            <a:pPr lvl="1"/>
+            <a:r>
+              <a:rPr lang="de-DE" dirty="0" smtClean="0"/>
+              <a:t>Ausgangssituation</a:t>
+            </a:r>
+          </a:p>
+          <a:p>
+            <a:pPr lvl="1"/>
+            <a:r>
+              <a:rPr lang="de-DE" dirty="0" smtClean="0"/>
+              <a:t>Strategie</a:t>
+            </a:r>
+            <a:endParaRPr lang="de-DE" dirty="0" smtClean="0"/>
+          </a:p>
+          <a:p>
+            <a:pPr lvl="1"/>
+            <a:r>
+              <a:rPr lang="de-DE" dirty="0" smtClean="0"/>
+              <a:t>Ergebnisse</a:t>
+            </a:r>
+          </a:p>
+          <a:p>
+            <a:r>
+              <a:rPr lang="de-DE" dirty="0" smtClean="0"/>
+              <a:t>Technologie</a:t>
+            </a:r>
+          </a:p>
+          <a:p>
+            <a:r>
+              <a:rPr lang="de-DE" dirty="0" smtClean="0"/>
+              <a:t>Live - Demonstration</a:t>
+            </a:r>
+            <a:endParaRPr lang="de-DE" dirty="0"/>
+          </a:p>
+        </p:txBody>
+      </p:sp>
+    </p:spTree>
+  </p:cSld>
+  <p:clrMapOvr>
+    <a:masterClrMapping/>
+  </p:clrMapOvr>
+  <p:timing>
+    <p:tnLst>
+      <p:par>
+        <p:cTn id="1" dur="indefinite" restart="never" nodeType="tmRoot"/>
+      </p:par>
+    </p:tnLst>
+  </p:timing>
+</p:sld>
+</file>
+
+<file path=ppt/slides/slide3.xml><?xml version="1.0" encoding="utf-8"?>
+<p:sld xmlns:a="http://schemas.openxmlformats.org/drawingml/2006/main" xmlns:r="http://schemas.openxmlformats.org/officeDocument/2006/relationships" xmlns:p="http://schemas.openxmlformats.org/presentationml/2006/main">
+  <p:cSld>
+    <p:spTree>
+      <p:nvGrpSpPr>
+        <p:cNvPr id="1" name=""/>
+        <p:cNvGrpSpPr/>
+        <p:nvPr/>
+      </p:nvGrpSpPr>
+      <p:grpSpPr>
+        <a:xfrm>
+          <a:off x="0" y="0"/>
+          <a:ext cx="0" cy="0"/>
+          <a:chOff x="0" y="0"/>
+          <a:chExt cx="0" cy="0"/>
+        </a:xfrm>
+      </p:grpSpPr>
+      <p:sp>
+        <p:nvSpPr>
+          <p:cNvPr id="4" name="Titel 1"/>
+          <p:cNvSpPr>
+            <a:spLocks noGrp="1"/>
+          </p:cNvSpPr>
+          <p:nvPr>
+            <p:ph type="title"/>
+          </p:nvPr>
+        </p:nvSpPr>
+        <p:spPr>
+          <a:xfrm>
+            <a:off x="0" y="1428736"/>
+            <a:ext cx="9144000" cy="4000528"/>
+          </a:xfrm>
+        </p:spPr>
+        <p:txBody>
+          <a:bodyPr>
+            <a:noAutofit/>
+          </a:bodyPr>
+          <a:lstStyle/>
+          <a:p>
+            <a:pPr algn="ctr"/>
+            <a:r>
+              <a:rPr lang="de-DE" sz="6000" dirty="0" smtClean="0"/>
+              <a:t>Was ist der </a:t>
+            </a:r>
+            <a:br>
+              <a:rPr lang="de-DE" sz="6000" dirty="0" smtClean="0"/>
+            </a:br>
+            <a:r>
+              <a:rPr lang="de-DE" sz="6000" dirty="0" err="1" smtClean="0"/>
+              <a:t>Supply</a:t>
+            </a:r>
+            <a:r>
+              <a:rPr lang="de-DE" sz="6000" dirty="0" smtClean="0"/>
+              <a:t> Chain Manager?</a:t>
+            </a:r>
+            <a:endParaRPr lang="de-DE" sz="6000" dirty="0"/>
+          </a:p>
+        </p:txBody>
+      </p:sp>
+    </p:spTree>
+  </p:cSld>
+  <p:clrMapOvr>
+    <a:masterClrMapping/>
+  </p:clrMapOvr>
+  <p:timing>
+    <p:tnLst>
+      <p:par>
+        <p:cTn id="1" dur="indefinite" restart="never" nodeType="tmRoot"/>
+      </p:par>
+    </p:tnLst>
+  </p:timing>
+</p:sld>
+</file>
+
+<file path=ppt/slides/slide4.xml><?xml version="1.0" encoding="utf-8"?>
+<p:sld xmlns:a="http://schemas.openxmlformats.org/drawingml/2006/main" xmlns:r="http://schemas.openxmlformats.org/officeDocument/2006/relationships" xmlns:p="http://schemas.openxmlformats.org/presentationml/2006/main">
+  <p:cSld>
+    <p:spTree>
+      <p:nvGrpSpPr>
+        <p:cNvPr id="1" name=""/>
+        <p:cNvGrpSpPr/>
+        <p:nvPr/>
+      </p:nvGrpSpPr>
+      <p:grpSpPr>
+        <a:xfrm>
+          <a:off x="0" y="0"/>
+          <a:ext cx="0" cy="0"/>
+          <a:chOff x="0" y="0"/>
+          <a:chExt cx="0" cy="0"/>
+        </a:xfrm>
+      </p:grpSpPr>
+      <p:graphicFrame>
+        <p:nvGraphicFramePr>
+          <p:cNvPr id="4" name="Inhaltsplatzhalter 3"/>
+          <p:cNvGraphicFramePr>
+            <a:graphicFrameLocks noGrp="1"/>
+          </p:cNvGraphicFramePr>
+          <p:nvPr>
+            <p:ph idx="1"/>
+          </p:nvPr>
+        </p:nvGraphicFramePr>
+        <p:xfrm>
+          <a:off x="457200" y="2249488"/>
+          <a:ext cx="8229600" cy="4324350"/>
+        </p:xfrm>
+        <a:graphic>
+          <a:graphicData uri="http://schemas.openxmlformats.org/drawingml/2006/diagram">
+            <dgm:relIds xmlns:dgm="http://schemas.openxmlformats.org/drawingml/2006/diagram" xmlns:r="http://schemas.openxmlformats.org/officeDocument/2006/relationships" r:dm="rId2" r:lo="rId3" r:qs="rId4" r:cs="rId5"/>
+          </a:graphicData>
+        </a:graphic>
+      </p:graphicFrame>
+      <p:sp>
+        <p:nvSpPr>
+          <p:cNvPr id="5" name="Textfeld 4"/>
+          <p:cNvSpPr txBox="1"/>
+          <p:nvPr/>
+        </p:nvSpPr>
+        <p:spPr>
+          <a:xfrm>
+            <a:off x="357158" y="1363792"/>
+            <a:ext cx="7500990" cy="707886"/>
+          </a:xfrm>
+          <a:prstGeom prst="rect">
+            <a:avLst/>
+          </a:prstGeom>
+        </p:spPr>
+        <p:txBody>
+          <a:bodyPr vert="horz" anchor="ctr">
+            <a:normAutofit/>
+          </a:bodyPr>
+          <a:lstStyle/>
+          <a:p>
+            <a:pPr>
+              <a:spcBef>
+                <a:spcPct val="0"/>
+              </a:spcBef>
+            </a:pPr>
+            <a:r>
+              <a:rPr lang="de-DE" sz="4000" dirty="0" smtClean="0">
+                <a:solidFill>
+                  <a:schemeClr val="tx2"/>
+                </a:solidFill>
+                <a:latin typeface="+mj-lt"/>
+                <a:ea typeface="+mj-ea"/>
+                <a:cs typeface="+mj-cs"/>
+              </a:rPr>
+              <a:t>Der </a:t>
+            </a:r>
+            <a:r>
+              <a:rPr lang="de-DE" sz="4000" dirty="0" err="1" smtClean="0">
+                <a:solidFill>
+                  <a:schemeClr val="tx2"/>
+                </a:solidFill>
+                <a:latin typeface="+mj-lt"/>
+                <a:ea typeface="+mj-ea"/>
+                <a:cs typeface="+mj-cs"/>
+              </a:rPr>
+              <a:t>SCManager</a:t>
+            </a:r>
+            <a:endParaRPr lang="de-DE" sz="4000" dirty="0" smtClean="0">
+              <a:solidFill>
+                <a:schemeClr val="tx2"/>
+              </a:solidFill>
+              <a:latin typeface="+mj-lt"/>
+              <a:ea typeface="+mj-ea"/>
+              <a:cs typeface="+mj-cs"/>
+            </a:endParaRPr>
+          </a:p>
+        </p:txBody>
+      </p:sp>
+    </p:spTree>
+  </p:cSld>
+  <p:clrMapOvr>
+    <a:masterClrMapping/>
+  </p:clrMapOvr>
+  <p:timing>
+    <p:tnLst>
+      <p:par>
+        <p:cTn id="1" dur="indefinite" restart="never" nodeType="tmRoot"/>
+      </p:par>
+    </p:tnLst>
+  </p:timing>
+</p:sld>
+</file>
+
 <file path=ppt/slides/slide5.xml><?xml version="1.0" encoding="utf-8"?>
 <p:sld xmlns:a="http://schemas.openxmlformats.org/drawingml/2006/main" xmlns:r="http://schemas.openxmlformats.org/officeDocument/2006/relationships" xmlns:p="http://schemas.openxmlformats.org/presentationml/2006/main">
   <p:cSld>
@@ -5086,7 +8234,7 @@
       </p:grpSpPr>
       <p:sp>
         <p:nvSpPr>
-          <p:cNvPr id="2" name="Titel 1"/>
+          <p:cNvPr id="4" name="Titel 1"/>
           <p:cNvSpPr>
             <a:spLocks noGrp="1"/>
           </p:cNvSpPr>
@@ -5094,71 +8242,27 @@
             <p:ph type="title"/>
           </p:nvPr>
         </p:nvSpPr>
-        <p:spPr/>
-        <p:txBody>
-          <a:bodyPr/>
+        <p:spPr>
+          <a:xfrm>
+            <a:off x="2000232" y="2428868"/>
+            <a:ext cx="5214974" cy="1928826"/>
+          </a:xfrm>
+        </p:spPr>
+        <p:txBody>
+          <a:bodyPr>
+            <a:noAutofit/>
+          </a:bodyPr>
           <a:lstStyle/>
           <a:p>
-            <a:r>
-              <a:rPr lang="de-DE" dirty="0" smtClean="0"/>
-              <a:t>Webanwendung</a:t>
-            </a:r>
-            <a:endParaRPr lang="de-DE" dirty="0"/>
-          </a:p>
-        </p:txBody>
-      </p:sp>
-      <p:sp>
-        <p:nvSpPr>
-          <p:cNvPr id="3" name="Inhaltsplatzhalter 2"/>
-          <p:cNvSpPr>
-            <a:spLocks noGrp="1"/>
-          </p:cNvSpPr>
-          <p:nvPr>
-            <p:ph idx="1"/>
-          </p:nvPr>
-        </p:nvSpPr>
-        <p:spPr/>
-        <p:txBody>
-          <a:bodyPr/>
-          <a:lstStyle/>
-          <a:p>
-            <a:endParaRPr lang="de-DE" dirty="0"/>
-          </a:p>
-        </p:txBody>
-      </p:sp>
-      <p:pic>
-        <p:nvPicPr>
-          <p:cNvPr id="1027" name="Picture 3"/>
-          <p:cNvPicPr>
-            <a:picLocks noChangeAspect="1" noChangeArrowheads="1"/>
-          </p:cNvPicPr>
-          <p:nvPr/>
-        </p:nvPicPr>
-        <p:blipFill>
-          <a:blip r:embed="rId3"/>
-          <a:srcRect/>
-          <a:stretch>
-            <a:fillRect/>
-          </a:stretch>
-        </p:blipFill>
-        <p:spPr bwMode="auto">
-          <a:xfrm>
-            <a:off x="0" y="2000240"/>
-            <a:ext cx="9144000" cy="4900874"/>
-          </a:xfrm>
-          <a:prstGeom prst="rect">
-            <a:avLst/>
-          </a:prstGeom>
-          <a:noFill/>
-          <a:ln w="9525">
-            <a:noFill/>
-            <a:miter lim="800000"/>
-            <a:headEnd/>
-            <a:tailEnd/>
-          </a:ln>
-          <a:effectLst/>
-        </p:spPr>
-      </p:pic>
+            <a:pPr algn="ctr"/>
+            <a:r>
+              <a:rPr lang="de-DE" sz="7000" dirty="0" smtClean="0"/>
+              <a:t>Planspiel</a:t>
+            </a:r>
+            <a:endParaRPr lang="de-DE" sz="7000" dirty="0"/>
+          </a:p>
+        </p:txBody>
+      </p:sp>
     </p:spTree>
   </p:cSld>
   <p:clrMapOvr>
@@ -5191,45 +8295,16 @@
           <a:chExt cx="0" cy="0"/>
         </a:xfrm>
       </p:grpSpPr>
-      <p:sp>
-        <p:nvSpPr>
-          <p:cNvPr id="2" name="Titel 1"/>
-          <p:cNvSpPr>
-            <a:spLocks noGrp="1"/>
-          </p:cNvSpPr>
-          <p:nvPr>
-            <p:ph type="title"/>
-          </p:nvPr>
-        </p:nvSpPr>
-        <p:spPr/>
-        <p:txBody>
-          <a:bodyPr/>
-          <a:lstStyle/>
-          <a:p>
-            <a:r>
-              <a:rPr lang="de-DE" dirty="0" smtClean="0"/>
-              <a:t>MEAN-</a:t>
-            </a:r>
-            <a:r>
-              <a:rPr lang="de-DE" dirty="0" err="1" smtClean="0"/>
-              <a:t>Stack</a:t>
-            </a:r>
-            <a:endParaRPr lang="de-DE" dirty="0"/>
-          </a:p>
-        </p:txBody>
-      </p:sp>
       <p:pic>
         <p:nvPicPr>
-          <p:cNvPr id="4" name="Inhaltsplatzhalter 3" descr="https://i.ytimg.com/vi/Jh0er2pRcq8/maxresdefault.jpg"/>
+          <p:cNvPr id="4" name="Picture 2"/>
           <p:cNvPicPr>
-            <a:picLocks noGrp="1"/>
+            <a:picLocks noChangeAspect="1" noChangeArrowheads="1"/>
           </p:cNvPicPr>
-          <p:nvPr>
-            <p:ph idx="1"/>
-          </p:nvPr>
+          <p:nvPr/>
         </p:nvPicPr>
         <p:blipFill>
-          <a:blip r:embed="rId3" cstate="print"/>
+          <a:blip r:embed="rId2"/>
           <a:srcRect/>
           <a:stretch>
             <a:fillRect/>
@@ -5237,8 +8312,8 @@
         </p:blipFill>
         <p:spPr bwMode="auto">
           <a:xfrm>
-            <a:off x="3428992" y="3357562"/>
-            <a:ext cx="5545915" cy="3393104"/>
+            <a:off x="72594" y="1170229"/>
+            <a:ext cx="9000000" cy="5616357"/>
           </a:xfrm>
           <a:prstGeom prst="rect">
             <a:avLst/>
@@ -5250,81 +8325,9 @@
             <a:headEnd/>
             <a:tailEnd/>
           </a:ln>
+          <a:effectLst/>
         </p:spPr>
       </p:pic>
-      <p:sp>
-        <p:nvSpPr>
-          <p:cNvPr id="6" name="Textfeld 5"/>
-          <p:cNvSpPr txBox="1"/>
-          <p:nvPr/>
-        </p:nvSpPr>
-        <p:spPr>
-          <a:xfrm>
-            <a:off x="428596" y="2357430"/>
-            <a:ext cx="5000660" cy="1200329"/>
-          </a:xfrm>
-          <a:prstGeom prst="rect">
-            <a:avLst/>
-          </a:prstGeom>
-          <a:noFill/>
-        </p:spPr>
-        <p:txBody>
-          <a:bodyPr wrap="square" rtlCol="0">
-            <a:spAutoFit/>
-          </a:bodyPr>
-          <a:lstStyle/>
-          <a:p>
-            <a:pPr>
-              <a:buFont typeface="Arial" pitchFamily="34" charset="0"/>
-              <a:buChar char="•"/>
-            </a:pPr>
-            <a:r>
-              <a:rPr lang="de-DE" dirty="0" smtClean="0"/>
-              <a:t> Mongo DB</a:t>
-            </a:r>
-          </a:p>
-          <a:p>
-            <a:pPr>
-              <a:buFont typeface="Arial" pitchFamily="34" charset="0"/>
-              <a:buChar char="•"/>
-            </a:pPr>
-            <a:r>
-              <a:rPr lang="de-DE" dirty="0" smtClean="0"/>
-              <a:t> Express </a:t>
-            </a:r>
-          </a:p>
-          <a:p>
-            <a:pPr>
-              <a:buFont typeface="Arial" pitchFamily="34" charset="0"/>
-              <a:buChar char="•"/>
-            </a:pPr>
-            <a:r>
-              <a:rPr lang="de-DE" dirty="0" smtClean="0"/>
-              <a:t> </a:t>
-            </a:r>
-            <a:r>
-              <a:rPr lang="de-DE" dirty="0" err="1" smtClean="0"/>
-              <a:t>AngularJS</a:t>
-            </a:r>
-            <a:endParaRPr lang="de-DE" dirty="0" smtClean="0"/>
-          </a:p>
-          <a:p>
-            <a:pPr>
-              <a:buFont typeface="Arial" pitchFamily="34" charset="0"/>
-              <a:buChar char="•"/>
-            </a:pPr>
-            <a:r>
-              <a:rPr lang="de-DE" dirty="0" smtClean="0"/>
-              <a:t> </a:t>
-            </a:r>
-            <a:r>
-              <a:rPr lang="de-DE" dirty="0" err="1" smtClean="0"/>
-              <a:t>NodeJs</a:t>
-            </a:r>
-            <a:endParaRPr lang="de-DE" dirty="0"/>
-          </a:p>
-        </p:txBody>
-      </p:sp>
     </p:spTree>
   </p:cSld>
   <p:clrMapOvr>
@@ -5357,73 +8360,113 @@
           <a:chExt cx="0" cy="0"/>
         </a:xfrm>
       </p:grpSpPr>
-      <p:sp>
-        <p:nvSpPr>
-          <p:cNvPr id="2" name="Titel 1"/>
-          <p:cNvSpPr>
-            <a:spLocks noGrp="1"/>
-          </p:cNvSpPr>
-          <p:nvPr>
-            <p:ph type="title"/>
-          </p:nvPr>
-        </p:nvSpPr>
-        <p:spPr/>
-        <p:txBody>
-          <a:bodyPr/>
+      <p:pic>
+        <p:nvPicPr>
+          <p:cNvPr id="4" name="Picture 2"/>
+          <p:cNvPicPr>
+            <a:picLocks noChangeAspect="1" noChangeArrowheads="1"/>
+          </p:cNvPicPr>
+          <p:nvPr/>
+        </p:nvPicPr>
+        <p:blipFill>
+          <a:blip r:embed="rId2"/>
+          <a:srcRect/>
+          <a:stretch>
+            <a:fillRect/>
+          </a:stretch>
+        </p:blipFill>
+        <p:spPr bwMode="auto">
+          <a:xfrm>
+            <a:off x="71406" y="1174091"/>
+            <a:ext cx="9000000" cy="5612495"/>
+          </a:xfrm>
+          <a:prstGeom prst="rect">
+            <a:avLst/>
+          </a:prstGeom>
+          <a:noFill/>
+          <a:ln w="9525">
+            <a:noFill/>
+            <a:miter lim="800000"/>
+            <a:headEnd/>
+            <a:tailEnd/>
+          </a:ln>
+          <a:effectLst/>
+        </p:spPr>
+      </p:pic>
+      <p:cxnSp>
+        <p:nvCxnSpPr>
+          <p:cNvPr id="6" name="Gerade Verbindung 5"/>
+          <p:cNvCxnSpPr/>
+          <p:nvPr/>
+        </p:nvCxnSpPr>
+        <p:spPr>
+          <a:xfrm>
+            <a:off x="1142976" y="3357562"/>
+            <a:ext cx="7572428" cy="1588"/>
+          </a:xfrm>
+          <a:prstGeom prst="line">
+            <a:avLst/>
+          </a:prstGeom>
+          <a:ln>
+            <a:solidFill>
+              <a:srgbClr val="FF0000"/>
+            </a:solidFill>
+          </a:ln>
+        </p:spPr>
+        <p:style>
+          <a:lnRef idx="1">
+            <a:schemeClr val="accent1"/>
+          </a:lnRef>
+          <a:fillRef idx="0">
+            <a:schemeClr val="accent1"/>
+          </a:fillRef>
+          <a:effectRef idx="0">
+            <a:schemeClr val="accent1"/>
+          </a:effectRef>
+          <a:fontRef idx="minor">
+            <a:schemeClr val="tx1"/>
+          </a:fontRef>
+        </p:style>
+      </p:cxnSp>
+      <p:sp>
+        <p:nvSpPr>
+          <p:cNvPr id="12" name="Textfeld 11"/>
+          <p:cNvSpPr txBox="1"/>
+          <p:nvPr/>
+        </p:nvSpPr>
+        <p:spPr>
+          <a:xfrm>
+            <a:off x="285720" y="3223439"/>
+            <a:ext cx="857256" cy="276999"/>
+          </a:xfrm>
+          <a:prstGeom prst="rect">
+            <a:avLst/>
+          </a:prstGeom>
+          <a:noFill/>
+        </p:spPr>
+        <p:txBody>
+          <a:bodyPr wrap="square" rtlCol="0">
+            <a:spAutoFit/>
+          </a:bodyPr>
           <a:lstStyle/>
           <a:p>
             <a:r>
-              <a:rPr lang="de-DE" dirty="0" smtClean="0"/>
-              <a:t>Programmiersprache</a:t>
-            </a:r>
-            <a:endParaRPr lang="de-DE" dirty="0"/>
-          </a:p>
-        </p:txBody>
-      </p:sp>
-      <p:sp>
-        <p:nvSpPr>
-          <p:cNvPr id="3" name="Inhaltsplatzhalter 2"/>
-          <p:cNvSpPr>
-            <a:spLocks noGrp="1"/>
-          </p:cNvSpPr>
-          <p:nvPr>
-            <p:ph idx="1"/>
-          </p:nvPr>
-        </p:nvSpPr>
-        <p:spPr/>
-        <p:txBody>
-          <a:bodyPr/>
-          <a:lstStyle/>
-          <a:p>
-            <a:r>
-              <a:rPr lang="de-DE" dirty="0" err="1" smtClean="0"/>
-              <a:t>Typescript</a:t>
-            </a:r>
-            <a:endParaRPr lang="de-DE" dirty="0" smtClean="0"/>
-          </a:p>
-          <a:p>
-            <a:pPr lvl="1"/>
-            <a:r>
-              <a:rPr lang="de-DE" dirty="0" err="1" smtClean="0"/>
-              <a:t>Superset</a:t>
-            </a:r>
-            <a:r>
-              <a:rPr lang="de-DE" dirty="0" smtClean="0"/>
-              <a:t> von </a:t>
-            </a:r>
-            <a:r>
-              <a:rPr lang="de-DE" dirty="0" err="1" smtClean="0"/>
-              <a:t>Javascript</a:t>
-            </a:r>
-            <a:endParaRPr lang="de-DE" dirty="0" smtClean="0"/>
-          </a:p>
-          <a:p>
-            <a:pPr lvl="1"/>
-            <a:r>
-              <a:rPr lang="de-DE" dirty="0" smtClean="0"/>
-              <a:t>Starke Typisierung</a:t>
-            </a:r>
-            <a:endParaRPr lang="de-DE" dirty="0"/>
+              <a:rPr lang="de-DE" sz="1200" dirty="0" smtClean="0">
+                <a:solidFill>
+                  <a:srgbClr val="FF0000"/>
+                </a:solidFill>
+                <a:latin typeface="Arial" pitchFamily="34" charset="0"/>
+                <a:cs typeface="Arial" pitchFamily="34" charset="0"/>
+              </a:rPr>
+              <a:t>250000 €</a:t>
+            </a:r>
+            <a:endParaRPr lang="de-DE" sz="1200" dirty="0">
+              <a:solidFill>
+                <a:srgbClr val="FF0000"/>
+              </a:solidFill>
+              <a:latin typeface="Arial" pitchFamily="34" charset="0"/>
+              <a:cs typeface="Arial" pitchFamily="34" charset="0"/>
+            </a:endParaRPr>
           </a:p>
         </p:txBody>
       </p:sp>
@@ -5476,7 +8519,7 @@
           <a:p>
             <a:r>
               <a:rPr lang="de-DE" dirty="0" smtClean="0"/>
-              <a:t>Development Tools</a:t>
+              <a:t>Strategie</a:t>
             </a:r>
             <a:endParaRPr lang="de-DE" dirty="0"/>
           </a:p>
@@ -5498,30 +8541,48 @@
           <a:lstStyle/>
           <a:p>
             <a:r>
-              <a:rPr lang="de-DE" dirty="0" err="1" smtClean="0"/>
-              <a:t>Git</a:t>
+              <a:rPr lang="de-DE" dirty="0" smtClean="0"/>
+              <a:t>Ziele</a:t>
+            </a:r>
+          </a:p>
+          <a:p>
+            <a:pPr lvl="1"/>
+            <a:r>
+              <a:rPr lang="de-DE" dirty="0" smtClean="0"/>
+              <a:t>Reduzieren der Lagerbeständen</a:t>
+            </a:r>
+          </a:p>
+          <a:p>
+            <a:pPr lvl="1"/>
+            <a:r>
+              <a:rPr lang="de-DE" dirty="0" smtClean="0"/>
+              <a:t>Abbauen der Warteschlangen</a:t>
             </a:r>
             <a:endParaRPr lang="de-DE" dirty="0" smtClean="0"/>
           </a:p>
           <a:p>
-            <a:r>
-              <a:rPr lang="de-DE" dirty="0" err="1" smtClean="0"/>
-              <a:t>Gulp</a:t>
-            </a:r>
             <a:endParaRPr lang="de-DE" dirty="0" smtClean="0"/>
           </a:p>
           <a:p>
             <a:r>
-              <a:rPr lang="de-DE" dirty="0" err="1" smtClean="0"/>
-              <a:t>Npm</a:t>
-            </a:r>
+              <a:rPr lang="de-DE" dirty="0" smtClean="0"/>
+              <a:t>Maßnahmen</a:t>
+            </a:r>
+          </a:p>
+          <a:p>
+            <a:pPr lvl="1"/>
+            <a:r>
+              <a:rPr lang="de-DE" dirty="0" smtClean="0"/>
+              <a:t>Kategorisieren der Erzeugnisse nach Teilewert und Fertigungskomplexität</a:t>
+            </a:r>
+          </a:p>
+          <a:p>
+            <a:pPr lvl="1">
+              <a:buNone/>
+            </a:pPr>
             <a:endParaRPr lang="de-DE" dirty="0" smtClean="0"/>
           </a:p>
           <a:p>
-            <a:r>
-              <a:rPr lang="de-DE" dirty="0" err="1" smtClean="0"/>
-              <a:t>Webstorm</a:t>
-            </a:r>
             <a:endParaRPr lang="de-DE" dirty="0"/>
           </a:p>
         </p:txBody>
@@ -5558,53 +8619,51 @@
           <a:chExt cx="0" cy="0"/>
         </a:xfrm>
       </p:grpSpPr>
-      <p:sp>
-        <p:nvSpPr>
-          <p:cNvPr id="2" name="Titel 1"/>
-          <p:cNvSpPr>
-            <a:spLocks noGrp="1"/>
-          </p:cNvSpPr>
-          <p:nvPr>
-            <p:ph type="title"/>
-          </p:nvPr>
-        </p:nvSpPr>
-        <p:spPr/>
-        <p:txBody>
-          <a:bodyPr/>
-          <a:lstStyle/>
-          <a:p>
-            <a:r>
-              <a:rPr lang="de-DE" smtClean="0"/>
-              <a:t>Livedemonstration</a:t>
-            </a:r>
-            <a:endParaRPr lang="de-DE"/>
-          </a:p>
-        </p:txBody>
-      </p:sp>
-      <p:sp>
-        <p:nvSpPr>
-          <p:cNvPr id="3" name="Inhaltsplatzhalter 2"/>
-          <p:cNvSpPr>
-            <a:spLocks noGrp="1"/>
-          </p:cNvSpPr>
-          <p:nvPr>
-            <p:ph idx="1"/>
-          </p:nvPr>
-        </p:nvSpPr>
-        <p:spPr/>
-        <p:txBody>
-          <a:bodyPr/>
-          <a:lstStyle/>
-          <a:p>
-            <a:endParaRPr lang="de-DE"/>
-          </a:p>
-        </p:txBody>
-      </p:sp>
+      <p:pic>
+        <p:nvPicPr>
+          <p:cNvPr id="2050" name="Picture 2"/>
+          <p:cNvPicPr>
+            <a:picLocks noChangeAspect="1" noChangeArrowheads="1"/>
+          </p:cNvPicPr>
+          <p:nvPr/>
+        </p:nvPicPr>
+        <p:blipFill>
+          <a:blip r:embed="rId2"/>
+          <a:srcRect/>
+          <a:stretch>
+            <a:fillRect/>
+          </a:stretch>
+        </p:blipFill>
+        <p:spPr bwMode="auto">
+          <a:xfrm>
+            <a:off x="71406" y="1190562"/>
+            <a:ext cx="9000000" cy="5596024"/>
+          </a:xfrm>
+          <a:prstGeom prst="rect">
+            <a:avLst/>
+          </a:prstGeom>
+          <a:noFill/>
+          <a:ln w="9525">
+            <a:noFill/>
+            <a:miter lim="800000"/>
+            <a:headEnd/>
+            <a:tailEnd/>
+          </a:ln>
+          <a:effectLst/>
+        </p:spPr>
+      </p:pic>
     </p:spTree>
   </p:cSld>
   <p:clrMapOvr>
     <a:masterClrMapping/>
   </p:clrMapOvr>
+  <p:timing>
+    <p:tnLst>
+      <p:par>
+        <p:cTn id="1" dur="indefinite" restart="never" nodeType="tmRoot"/>
+      </p:par>
+    </p:tnLst>
+  </p:timing>
 </p:sld>
 </file>
 

</xml_diff>